<commit_message>
Added Keys section, need help with Keys lab
</commit_message>
<xml_diff>
--- a/Projects/recap/week5a_recap.pptx
+++ b/Projects/recap/week5a_recap.pptx
@@ -4,6 +4,9 @@
   <p:sldMasterIdLst>
     <p:sldMasterId id="2147483660" r:id="rId1"/>
   </p:sldMasterIdLst>
+  <p:notesMasterIdLst>
+    <p:notesMasterId r:id="rId16"/>
+  </p:notesMasterIdLst>
   <p:sldIdLst>
     <p:sldId id="256" r:id="rId2"/>
     <p:sldId id="257" r:id="rId3"/>
@@ -13,6 +16,12 @@
     <p:sldId id="259" r:id="rId7"/>
     <p:sldId id="261" r:id="rId8"/>
     <p:sldId id="260" r:id="rId9"/>
+    <p:sldId id="264" r:id="rId10"/>
+    <p:sldId id="267" r:id="rId11"/>
+    <p:sldId id="265" r:id="rId12"/>
+    <p:sldId id="266" r:id="rId13"/>
+    <p:sldId id="268" r:id="rId14"/>
+    <p:sldId id="269" r:id="rId15"/>
   </p:sldIdLst>
   <p:sldSz cx="9144000" cy="6858000" type="screen4x3"/>
   <p:notesSz cx="6858000" cy="9144000"/>
@@ -111,7 +120,469 @@
       </a:defRPr>
     </a:lvl9pPr>
   </p:defaultTextStyle>
+  <p:extLst>
+    <p:ext uri="{EFAFB233-063F-42B5-8137-9DF3F51BA10A}">
+      <p15:sldGuideLst xmlns:p15="http://schemas.microsoft.com/office/powerpoint/2012/main">
+        <p15:guide id="1" orient="horz" pos="2160">
+          <p15:clr>
+            <a:srgbClr val="A4A3A4"/>
+          </p15:clr>
+        </p15:guide>
+        <p15:guide id="2" pos="2880">
+          <p15:clr>
+            <a:srgbClr val="A4A3A4"/>
+          </p15:clr>
+        </p15:guide>
+      </p15:sldGuideLst>
+    </p:ext>
+  </p:extLst>
 </p:presentation>
+</file>
+
+<file path=ppt/commentAuthors.xml><?xml version="1.0" encoding="utf-8"?>
+<p:cmAuthorLst xmlns:a="http://schemas.openxmlformats.org/drawingml/2006/main" xmlns:r="http://schemas.openxmlformats.org/officeDocument/2006/relationships" xmlns:p="http://schemas.openxmlformats.org/presentationml/2006/main">
+  <p:cmAuthor id="1" name="Kiefer Capps" initials="KC" lastIdx="0" clrIdx="0">
+    <p:extLst>
+      <p:ext uri="{19B8F6BF-5375-455C-9EA6-DF929625EA0E}">
+        <p15:presenceInfo xmlns:p15="http://schemas.microsoft.com/office/powerpoint/2012/main" userId="cda3282c4b2dace2" providerId="Windows Live"/>
+      </p:ext>
+    </p:extLst>
+  </p:cmAuthor>
+</p:cmAuthorLst>
+</file>
+
+<file path=ppt/notesMasters/notesMaster1.xml><?xml version="1.0" encoding="utf-8"?>
+<p:notesMaster xmlns:a="http://schemas.openxmlformats.org/drawingml/2006/main" xmlns:r="http://schemas.openxmlformats.org/officeDocument/2006/relationships" xmlns:p="http://schemas.openxmlformats.org/presentationml/2006/main">
+  <p:cSld>
+    <p:bg>
+      <p:bgRef idx="1001">
+        <a:schemeClr val="bg1"/>
+      </p:bgRef>
+    </p:bg>
+    <p:spTree>
+      <p:nvGrpSpPr>
+        <p:cNvPr id="1" name=""/>
+        <p:cNvGrpSpPr/>
+        <p:nvPr/>
+      </p:nvGrpSpPr>
+      <p:grpSpPr>
+        <a:xfrm>
+          <a:off x="0" y="0"/>
+          <a:ext cx="0" cy="0"/>
+          <a:chOff x="0" y="0"/>
+          <a:chExt cx="0" cy="0"/>
+        </a:xfrm>
+      </p:grpSpPr>
+      <p:sp>
+        <p:nvSpPr>
+          <p:cNvPr id="2" name="Header Placeholder 1"/>
+          <p:cNvSpPr>
+            <a:spLocks noGrp="1"/>
+          </p:cNvSpPr>
+          <p:nvPr>
+            <p:ph type="hdr" sz="quarter"/>
+          </p:nvPr>
+        </p:nvSpPr>
+        <p:spPr>
+          <a:xfrm>
+            <a:off x="0" y="0"/>
+            <a:ext cx="2971800" cy="458788"/>
+          </a:xfrm>
+          <a:prstGeom prst="rect">
+            <a:avLst/>
+          </a:prstGeom>
+        </p:spPr>
+        <p:txBody>
+          <a:bodyPr vert="horz" lIns="91440" tIns="45720" rIns="91440" bIns="45720" rtlCol="0"/>
+          <a:lstStyle>
+            <a:lvl1pPr algn="l">
+              <a:defRPr sz="1200"/>
+            </a:lvl1pPr>
+          </a:lstStyle>
+          <a:p>
+            <a:endParaRPr lang="en-US"/>
+          </a:p>
+        </p:txBody>
+      </p:sp>
+      <p:sp>
+        <p:nvSpPr>
+          <p:cNvPr id="3" name="Date Placeholder 2"/>
+          <p:cNvSpPr>
+            <a:spLocks noGrp="1"/>
+          </p:cNvSpPr>
+          <p:nvPr>
+            <p:ph type="dt" idx="1"/>
+          </p:nvPr>
+        </p:nvSpPr>
+        <p:spPr>
+          <a:xfrm>
+            <a:off x="3884613" y="0"/>
+            <a:ext cx="2971800" cy="458788"/>
+          </a:xfrm>
+          <a:prstGeom prst="rect">
+            <a:avLst/>
+          </a:prstGeom>
+        </p:spPr>
+        <p:txBody>
+          <a:bodyPr vert="horz" lIns="91440" tIns="45720" rIns="91440" bIns="45720" rtlCol="0"/>
+          <a:lstStyle>
+            <a:lvl1pPr algn="r">
+              <a:defRPr sz="1200"/>
+            </a:lvl1pPr>
+          </a:lstStyle>
+          <a:p>
+            <a:fld id="{8E9F2F70-7F24-48F2-BAC3-4187E7DFC08C}" type="datetimeFigureOut">
+              <a:rPr lang="en-US" smtClean="0"/>
+              <a:t>3/22/2015</a:t>
+            </a:fld>
+            <a:endParaRPr lang="en-US"/>
+          </a:p>
+        </p:txBody>
+      </p:sp>
+      <p:sp>
+        <p:nvSpPr>
+          <p:cNvPr id="4" name="Slide Image Placeholder 3"/>
+          <p:cNvSpPr>
+            <a:spLocks noGrp="1" noRot="1" noChangeAspect="1"/>
+          </p:cNvSpPr>
+          <p:nvPr>
+            <p:ph type="sldImg" idx="2"/>
+          </p:nvPr>
+        </p:nvSpPr>
+        <p:spPr>
+          <a:xfrm>
+            <a:off x="1371600" y="1143000"/>
+            <a:ext cx="4114800" cy="3086100"/>
+          </a:xfrm>
+          <a:prstGeom prst="rect">
+            <a:avLst/>
+          </a:prstGeom>
+          <a:noFill/>
+          <a:ln w="12700">
+            <a:solidFill>
+              <a:prstClr val="black"/>
+            </a:solidFill>
+          </a:ln>
+        </p:spPr>
+        <p:txBody>
+          <a:bodyPr vert="horz" lIns="91440" tIns="45720" rIns="91440" bIns="45720" rtlCol="0" anchor="ctr"/>
+          <a:lstStyle/>
+          <a:p>
+            <a:endParaRPr lang="en-US"/>
+          </a:p>
+        </p:txBody>
+      </p:sp>
+      <p:sp>
+        <p:nvSpPr>
+          <p:cNvPr id="5" name="Notes Placeholder 4"/>
+          <p:cNvSpPr>
+            <a:spLocks noGrp="1"/>
+          </p:cNvSpPr>
+          <p:nvPr>
+            <p:ph type="body" sz="quarter" idx="3"/>
+          </p:nvPr>
+        </p:nvSpPr>
+        <p:spPr>
+          <a:xfrm>
+            <a:off x="685800" y="4400550"/>
+            <a:ext cx="5486400" cy="3600450"/>
+          </a:xfrm>
+          <a:prstGeom prst="rect">
+            <a:avLst/>
+          </a:prstGeom>
+        </p:spPr>
+        <p:txBody>
+          <a:bodyPr vert="horz" lIns="91440" tIns="45720" rIns="91440" bIns="45720" rtlCol="0"/>
+          <a:lstStyle/>
+          <a:p>
+            <a:pPr lvl="0"/>
+            <a:r>
+              <a:rPr lang="en-US" smtClean="0"/>
+              <a:t>Click to edit Master text styles</a:t>
+            </a:r>
+          </a:p>
+          <a:p>
+            <a:pPr lvl="1"/>
+            <a:r>
+              <a:rPr lang="en-US" smtClean="0"/>
+              <a:t>Second level</a:t>
+            </a:r>
+          </a:p>
+          <a:p>
+            <a:pPr lvl="2"/>
+            <a:r>
+              <a:rPr lang="en-US" smtClean="0"/>
+              <a:t>Third level</a:t>
+            </a:r>
+          </a:p>
+          <a:p>
+            <a:pPr lvl="3"/>
+            <a:r>
+              <a:rPr lang="en-US" smtClean="0"/>
+              <a:t>Fourth level</a:t>
+            </a:r>
+          </a:p>
+          <a:p>
+            <a:pPr lvl="4"/>
+            <a:r>
+              <a:rPr lang="en-US" smtClean="0"/>
+              <a:t>Fifth level</a:t>
+            </a:r>
+            <a:endParaRPr lang="en-US"/>
+          </a:p>
+        </p:txBody>
+      </p:sp>
+      <p:sp>
+        <p:nvSpPr>
+          <p:cNvPr id="6" name="Footer Placeholder 5"/>
+          <p:cNvSpPr>
+            <a:spLocks noGrp="1"/>
+          </p:cNvSpPr>
+          <p:nvPr>
+            <p:ph type="ftr" sz="quarter" idx="4"/>
+          </p:nvPr>
+        </p:nvSpPr>
+        <p:spPr>
+          <a:xfrm>
+            <a:off x="0" y="8685213"/>
+            <a:ext cx="2971800" cy="458787"/>
+          </a:xfrm>
+          <a:prstGeom prst="rect">
+            <a:avLst/>
+          </a:prstGeom>
+        </p:spPr>
+        <p:txBody>
+          <a:bodyPr vert="horz" lIns="91440" tIns="45720" rIns="91440" bIns="45720" rtlCol="0" anchor="b"/>
+          <a:lstStyle>
+            <a:lvl1pPr algn="l">
+              <a:defRPr sz="1200"/>
+            </a:lvl1pPr>
+          </a:lstStyle>
+          <a:p>
+            <a:endParaRPr lang="en-US"/>
+          </a:p>
+        </p:txBody>
+      </p:sp>
+      <p:sp>
+        <p:nvSpPr>
+          <p:cNvPr id="7" name="Slide Number Placeholder 6"/>
+          <p:cNvSpPr>
+            <a:spLocks noGrp="1"/>
+          </p:cNvSpPr>
+          <p:nvPr>
+            <p:ph type="sldNum" sz="quarter" idx="5"/>
+          </p:nvPr>
+        </p:nvSpPr>
+        <p:spPr>
+          <a:xfrm>
+            <a:off x="3884613" y="8685213"/>
+            <a:ext cx="2971800" cy="458787"/>
+          </a:xfrm>
+          <a:prstGeom prst="rect">
+            <a:avLst/>
+          </a:prstGeom>
+        </p:spPr>
+        <p:txBody>
+          <a:bodyPr vert="horz" lIns="91440" tIns="45720" rIns="91440" bIns="45720" rtlCol="0" anchor="b"/>
+          <a:lstStyle>
+            <a:lvl1pPr algn="r">
+              <a:defRPr sz="1200"/>
+            </a:lvl1pPr>
+          </a:lstStyle>
+          <a:p>
+            <a:fld id="{CCBC314B-187C-49E7-BB8E-DAC293939B19}" type="slidenum">
+              <a:rPr lang="en-US" smtClean="0"/>
+              <a:t>‹#›</a:t>
+            </a:fld>
+            <a:endParaRPr lang="en-US"/>
+          </a:p>
+        </p:txBody>
+      </p:sp>
+    </p:spTree>
+    <p:extLst>
+      <p:ext uri="{BB962C8B-B14F-4D97-AF65-F5344CB8AC3E}">
+        <p14:creationId xmlns:p14="http://schemas.microsoft.com/office/powerpoint/2010/main" val="2313597806"/>
+      </p:ext>
+    </p:extLst>
+  </p:cSld>
+  <p:clrMap bg1="lt1" tx1="dk1" bg2="lt2" tx2="dk2" accent1="accent1" accent2="accent2" accent3="accent3" accent4="accent4" accent5="accent5" accent6="accent6" hlink="hlink" folHlink="folHlink"/>
+  <p:notesStyle>
+    <a:lvl1pPr marL="0" algn="l" defTabSz="914400" rtl="0" eaLnBrk="1" latinLnBrk="0" hangingPunct="1">
+      <a:defRPr sz="1200" kern="1200">
+        <a:solidFill>
+          <a:schemeClr val="tx1"/>
+        </a:solidFill>
+        <a:latin typeface="+mn-lt"/>
+        <a:ea typeface="+mn-ea"/>
+        <a:cs typeface="+mn-cs"/>
+      </a:defRPr>
+    </a:lvl1pPr>
+    <a:lvl2pPr marL="457200" algn="l" defTabSz="914400" rtl="0" eaLnBrk="1" latinLnBrk="0" hangingPunct="1">
+      <a:defRPr sz="1200" kern="1200">
+        <a:solidFill>
+          <a:schemeClr val="tx1"/>
+        </a:solidFill>
+        <a:latin typeface="+mn-lt"/>
+        <a:ea typeface="+mn-ea"/>
+        <a:cs typeface="+mn-cs"/>
+      </a:defRPr>
+    </a:lvl2pPr>
+    <a:lvl3pPr marL="914400" algn="l" defTabSz="914400" rtl="0" eaLnBrk="1" latinLnBrk="0" hangingPunct="1">
+      <a:defRPr sz="1200" kern="1200">
+        <a:solidFill>
+          <a:schemeClr val="tx1"/>
+        </a:solidFill>
+        <a:latin typeface="+mn-lt"/>
+        <a:ea typeface="+mn-ea"/>
+        <a:cs typeface="+mn-cs"/>
+      </a:defRPr>
+    </a:lvl3pPr>
+    <a:lvl4pPr marL="1371600" algn="l" defTabSz="914400" rtl="0" eaLnBrk="1" latinLnBrk="0" hangingPunct="1">
+      <a:defRPr sz="1200" kern="1200">
+        <a:solidFill>
+          <a:schemeClr val="tx1"/>
+        </a:solidFill>
+        <a:latin typeface="+mn-lt"/>
+        <a:ea typeface="+mn-ea"/>
+        <a:cs typeface="+mn-cs"/>
+      </a:defRPr>
+    </a:lvl4pPr>
+    <a:lvl5pPr marL="1828800" algn="l" defTabSz="914400" rtl="0" eaLnBrk="1" latinLnBrk="0" hangingPunct="1">
+      <a:defRPr sz="1200" kern="1200">
+        <a:solidFill>
+          <a:schemeClr val="tx1"/>
+        </a:solidFill>
+        <a:latin typeface="+mn-lt"/>
+        <a:ea typeface="+mn-ea"/>
+        <a:cs typeface="+mn-cs"/>
+      </a:defRPr>
+    </a:lvl5pPr>
+    <a:lvl6pPr marL="2286000" algn="l" defTabSz="914400" rtl="0" eaLnBrk="1" latinLnBrk="0" hangingPunct="1">
+      <a:defRPr sz="1200" kern="1200">
+        <a:solidFill>
+          <a:schemeClr val="tx1"/>
+        </a:solidFill>
+        <a:latin typeface="+mn-lt"/>
+        <a:ea typeface="+mn-ea"/>
+        <a:cs typeface="+mn-cs"/>
+      </a:defRPr>
+    </a:lvl6pPr>
+    <a:lvl7pPr marL="2743200" algn="l" defTabSz="914400" rtl="0" eaLnBrk="1" latinLnBrk="0" hangingPunct="1">
+      <a:defRPr sz="1200" kern="1200">
+        <a:solidFill>
+          <a:schemeClr val="tx1"/>
+        </a:solidFill>
+        <a:latin typeface="+mn-lt"/>
+        <a:ea typeface="+mn-ea"/>
+        <a:cs typeface="+mn-cs"/>
+      </a:defRPr>
+    </a:lvl7pPr>
+    <a:lvl8pPr marL="3200400" algn="l" defTabSz="914400" rtl="0" eaLnBrk="1" latinLnBrk="0" hangingPunct="1">
+      <a:defRPr sz="1200" kern="1200">
+        <a:solidFill>
+          <a:schemeClr val="tx1"/>
+        </a:solidFill>
+        <a:latin typeface="+mn-lt"/>
+        <a:ea typeface="+mn-ea"/>
+        <a:cs typeface="+mn-cs"/>
+      </a:defRPr>
+    </a:lvl8pPr>
+    <a:lvl9pPr marL="3657600" algn="l" defTabSz="914400" rtl="0" eaLnBrk="1" latinLnBrk="0" hangingPunct="1">
+      <a:defRPr sz="1200" kern="1200">
+        <a:solidFill>
+          <a:schemeClr val="tx1"/>
+        </a:solidFill>
+        <a:latin typeface="+mn-lt"/>
+        <a:ea typeface="+mn-ea"/>
+        <a:cs typeface="+mn-cs"/>
+      </a:defRPr>
+    </a:lvl9pPr>
+  </p:notesStyle>
+</p:notesMaster>
+</file>
+
+<file path=ppt/notesSlides/notesSlide1.xml><?xml version="1.0" encoding="utf-8"?>
+<p:notes xmlns:a="http://schemas.openxmlformats.org/drawingml/2006/main" xmlns:r="http://schemas.openxmlformats.org/officeDocument/2006/relationships" xmlns:p="http://schemas.openxmlformats.org/presentationml/2006/main">
+  <p:cSld>
+    <p:spTree>
+      <p:nvGrpSpPr>
+        <p:cNvPr id="1" name=""/>
+        <p:cNvGrpSpPr/>
+        <p:nvPr/>
+      </p:nvGrpSpPr>
+      <p:grpSpPr>
+        <a:xfrm>
+          <a:off x="0" y="0"/>
+          <a:ext cx="0" cy="0"/>
+          <a:chOff x="0" y="0"/>
+          <a:chExt cx="0" cy="0"/>
+        </a:xfrm>
+      </p:grpSpPr>
+      <p:sp>
+        <p:nvSpPr>
+          <p:cNvPr id="2" name="Slide Image Placeholder 1"/>
+          <p:cNvSpPr>
+            <a:spLocks noGrp="1" noRot="1" noChangeAspect="1"/>
+          </p:cNvSpPr>
+          <p:nvPr>
+            <p:ph type="sldImg"/>
+          </p:nvPr>
+        </p:nvSpPr>
+        <p:spPr/>
+      </p:sp>
+      <p:sp>
+        <p:nvSpPr>
+          <p:cNvPr id="3" name="Notes Placeholder 2"/>
+          <p:cNvSpPr>
+            <a:spLocks noGrp="1"/>
+          </p:cNvSpPr>
+          <p:nvPr>
+            <p:ph type="body" idx="1"/>
+          </p:nvPr>
+        </p:nvSpPr>
+        <p:spPr/>
+        <p:txBody>
+          <a:bodyPr/>
+          <a:lstStyle/>
+          <a:p>
+            <a:endParaRPr lang="en-US" dirty="0"/>
+          </a:p>
+        </p:txBody>
+      </p:sp>
+      <p:sp>
+        <p:nvSpPr>
+          <p:cNvPr id="4" name="Slide Number Placeholder 3"/>
+          <p:cNvSpPr>
+            <a:spLocks noGrp="1"/>
+          </p:cNvSpPr>
+          <p:nvPr>
+            <p:ph type="sldNum" sz="quarter" idx="10"/>
+          </p:nvPr>
+        </p:nvSpPr>
+        <p:spPr/>
+        <p:txBody>
+          <a:bodyPr/>
+          <a:lstStyle/>
+          <a:p>
+            <a:fld id="{CCBC314B-187C-49E7-BB8E-DAC293939B19}" type="slidenum">
+              <a:rPr lang="en-US" smtClean="0"/>
+              <a:t>9</a:t>
+            </a:fld>
+            <a:endParaRPr lang="en-US"/>
+          </a:p>
+        </p:txBody>
+      </p:sp>
+    </p:spTree>
+    <p:extLst>
+      <p:ext uri="{BB962C8B-B14F-4D97-AF65-F5344CB8AC3E}">
+        <p14:creationId xmlns:p14="http://schemas.microsoft.com/office/powerpoint/2010/main" val="451756191"/>
+      </p:ext>
+    </p:extLst>
+  </p:cSld>
+  <p:clrMapOvr>
+    <a:masterClrMapping/>
+  </p:clrMapOvr>
+</p:notes>
 </file>
 
 <file path=ppt/slideLayouts/slideLayout1.xml><?xml version="1.0" encoding="utf-8"?>
@@ -6518,6 +6989,764 @@
 </p:sld>
 </file>
 
+<file path=ppt/slides/slide10.xml><?xml version="1.0" encoding="utf-8"?>
+<p:sld xmlns:a="http://schemas.openxmlformats.org/drawingml/2006/main" xmlns:r="http://schemas.openxmlformats.org/officeDocument/2006/relationships" xmlns:p="http://schemas.openxmlformats.org/presentationml/2006/main">
+  <p:cSld>
+    <p:spTree>
+      <p:nvGrpSpPr>
+        <p:cNvPr id="1" name=""/>
+        <p:cNvGrpSpPr/>
+        <p:nvPr/>
+      </p:nvGrpSpPr>
+      <p:grpSpPr>
+        <a:xfrm>
+          <a:off x="0" y="0"/>
+          <a:ext cx="0" cy="0"/>
+          <a:chOff x="0" y="0"/>
+          <a:chExt cx="0" cy="0"/>
+        </a:xfrm>
+      </p:grpSpPr>
+      <p:sp>
+        <p:nvSpPr>
+          <p:cNvPr id="2" name="Title 1"/>
+          <p:cNvSpPr>
+            <a:spLocks noGrp="1"/>
+          </p:cNvSpPr>
+          <p:nvPr>
+            <p:ph type="title"/>
+          </p:nvPr>
+        </p:nvSpPr>
+        <p:spPr>
+          <a:xfrm>
+            <a:off x="685800" y="512064"/>
+            <a:ext cx="8305800" cy="914400"/>
+          </a:xfrm>
+        </p:spPr>
+        <p:txBody>
+          <a:bodyPr/>
+          <a:lstStyle/>
+          <a:p>
+            <a:r>
+              <a:rPr lang="en-US" dirty="0" smtClean="0"/>
+              <a:t>Internal vs External Resistors</a:t>
+            </a:r>
+            <a:endParaRPr lang="en-US" dirty="0"/>
+          </a:p>
+        </p:txBody>
+      </p:sp>
+      <p:sp>
+        <p:nvSpPr>
+          <p:cNvPr id="3" name="Content Placeholder 2"/>
+          <p:cNvSpPr>
+            <a:spLocks noGrp="1"/>
+          </p:cNvSpPr>
+          <p:nvPr>
+            <p:ph idx="1"/>
+          </p:nvPr>
+        </p:nvSpPr>
+        <p:spPr>
+          <a:xfrm>
+            <a:off x="685800" y="1828800"/>
+            <a:ext cx="8229600" cy="4572000"/>
+          </a:xfrm>
+        </p:spPr>
+        <p:txBody>
+          <a:bodyPr/>
+          <a:lstStyle/>
+          <a:p>
+            <a:r>
+              <a:rPr lang="en-US" dirty="0" smtClean="0"/>
+              <a:t>External pull up/down resistors can be used to simplify programming.</a:t>
+            </a:r>
+          </a:p>
+          <a:p>
+            <a:endParaRPr lang="en-US" dirty="0"/>
+          </a:p>
+          <a:p>
+            <a:r>
+              <a:rPr lang="en-US" dirty="0" smtClean="0"/>
+              <a:t>Internal pull up/down resistors can lower cost, simplifies circuitry, and is convenient when parts are not readily available.</a:t>
+            </a:r>
+            <a:endParaRPr lang="en-US" dirty="0"/>
+          </a:p>
+        </p:txBody>
+      </p:sp>
+    </p:spTree>
+    <p:extLst>
+      <p:ext uri="{BB962C8B-B14F-4D97-AF65-F5344CB8AC3E}">
+        <p14:creationId xmlns:p14="http://schemas.microsoft.com/office/powerpoint/2010/main" val="591446997"/>
+      </p:ext>
+    </p:extLst>
+  </p:cSld>
+  <p:clrMapOvr>
+    <a:masterClrMapping/>
+  </p:clrMapOvr>
+</p:sld>
+</file>
+
+<file path=ppt/slides/slide11.xml><?xml version="1.0" encoding="utf-8"?>
+<p:sld xmlns:a="http://schemas.openxmlformats.org/drawingml/2006/main" xmlns:r="http://schemas.openxmlformats.org/officeDocument/2006/relationships" xmlns:p="http://schemas.openxmlformats.org/presentationml/2006/main">
+  <p:cSld>
+    <p:spTree>
+      <p:nvGrpSpPr>
+        <p:cNvPr id="1" name=""/>
+        <p:cNvGrpSpPr/>
+        <p:nvPr/>
+      </p:nvGrpSpPr>
+      <p:grpSpPr>
+        <a:xfrm>
+          <a:off x="0" y="0"/>
+          <a:ext cx="0" cy="0"/>
+          <a:chOff x="0" y="0"/>
+          <a:chExt cx="0" cy="0"/>
+        </a:xfrm>
+      </p:grpSpPr>
+      <p:sp>
+        <p:nvSpPr>
+          <p:cNvPr id="2" name="Title 1"/>
+          <p:cNvSpPr>
+            <a:spLocks noGrp="1"/>
+          </p:cNvSpPr>
+          <p:nvPr>
+            <p:ph type="title"/>
+          </p:nvPr>
+        </p:nvSpPr>
+        <p:spPr>
+          <a:xfrm>
+            <a:off x="914400" y="512064"/>
+            <a:ext cx="7924800" cy="914400"/>
+          </a:xfrm>
+        </p:spPr>
+        <p:txBody>
+          <a:bodyPr/>
+          <a:lstStyle/>
+          <a:p>
+            <a:r>
+              <a:rPr lang="en-US" sz="3600" dirty="0" smtClean="0"/>
+              <a:t>Real Time/Gadfly Synchronization</a:t>
+            </a:r>
+            <a:endParaRPr lang="en-US" sz="3600" dirty="0"/>
+          </a:p>
+        </p:txBody>
+      </p:sp>
+      <p:sp>
+        <p:nvSpPr>
+          <p:cNvPr id="3" name="Content Placeholder 2"/>
+          <p:cNvSpPr>
+            <a:spLocks noGrp="1"/>
+          </p:cNvSpPr>
+          <p:nvPr>
+            <p:ph idx="1"/>
+          </p:nvPr>
+        </p:nvSpPr>
+        <p:spPr>
+          <a:xfrm>
+            <a:off x="914400" y="1426464"/>
+            <a:ext cx="7772400" cy="2788440"/>
+          </a:xfrm>
+        </p:spPr>
+        <p:txBody>
+          <a:bodyPr/>
+          <a:lstStyle/>
+          <a:p>
+            <a:r>
+              <a:rPr lang="en-US" dirty="0" smtClean="0"/>
+              <a:t>The program continually “asks” the status of the switch, also called polling</a:t>
+            </a:r>
+          </a:p>
+          <a:p>
+            <a:pPr marL="68580" indent="0">
+              <a:buNone/>
+            </a:pPr>
+            <a:endParaRPr lang="en-US" dirty="0" smtClean="0"/>
+          </a:p>
+          <a:p>
+            <a:r>
+              <a:rPr lang="en-US" dirty="0" smtClean="0"/>
+              <a:t>Even when the switch is not pressed the program is checking the status</a:t>
+            </a:r>
+            <a:endParaRPr lang="en-US" dirty="0"/>
+          </a:p>
+        </p:txBody>
+      </p:sp>
+      <p:pic>
+        <p:nvPicPr>
+          <p:cNvPr id="4" name="Picture 3"/>
+          <p:cNvPicPr>
+            <a:picLocks noChangeAspect="1"/>
+          </p:cNvPicPr>
+          <p:nvPr/>
+        </p:nvPicPr>
+        <p:blipFill>
+          <a:blip r:embed="rId2"/>
+          <a:stretch>
+            <a:fillRect/>
+          </a:stretch>
+        </p:blipFill>
+        <p:spPr>
+          <a:xfrm>
+            <a:off x="3276600" y="4114800"/>
+            <a:ext cx="3124200" cy="2614674"/>
+          </a:xfrm>
+          <a:prstGeom prst="rect">
+            <a:avLst/>
+          </a:prstGeom>
+        </p:spPr>
+      </p:pic>
+    </p:spTree>
+    <p:extLst>
+      <p:ext uri="{BB962C8B-B14F-4D97-AF65-F5344CB8AC3E}">
+        <p14:creationId xmlns:p14="http://schemas.microsoft.com/office/powerpoint/2010/main" val="3308376188"/>
+      </p:ext>
+    </p:extLst>
+  </p:cSld>
+  <p:clrMapOvr>
+    <a:masterClrMapping/>
+  </p:clrMapOvr>
+</p:sld>
+</file>
+
+<file path=ppt/slides/slide12.xml><?xml version="1.0" encoding="utf-8"?>
+<p:sld xmlns:a="http://schemas.openxmlformats.org/drawingml/2006/main" xmlns:r="http://schemas.openxmlformats.org/officeDocument/2006/relationships" xmlns:p="http://schemas.openxmlformats.org/presentationml/2006/main">
+  <p:cSld>
+    <p:spTree>
+      <p:nvGrpSpPr>
+        <p:cNvPr id="1" name=""/>
+        <p:cNvGrpSpPr/>
+        <p:nvPr/>
+      </p:nvGrpSpPr>
+      <p:grpSpPr>
+        <a:xfrm>
+          <a:off x="0" y="0"/>
+          <a:ext cx="0" cy="0"/>
+          <a:chOff x="0" y="0"/>
+          <a:chExt cx="0" cy="0"/>
+        </a:xfrm>
+      </p:grpSpPr>
+      <p:sp>
+        <p:nvSpPr>
+          <p:cNvPr id="2" name="Title 1"/>
+          <p:cNvSpPr>
+            <a:spLocks noGrp="1"/>
+          </p:cNvSpPr>
+          <p:nvPr>
+            <p:ph type="title"/>
+          </p:nvPr>
+        </p:nvSpPr>
+        <p:spPr>
+          <a:xfrm>
+            <a:off x="935736" y="152400"/>
+            <a:ext cx="7772400" cy="914400"/>
+          </a:xfrm>
+        </p:spPr>
+        <p:txBody>
+          <a:bodyPr/>
+          <a:lstStyle/>
+          <a:p>
+            <a:r>
+              <a:rPr lang="en-US" dirty="0" smtClean="0"/>
+              <a:t>Interrupt Synchronization</a:t>
+            </a:r>
+            <a:endParaRPr lang="en-US" dirty="0"/>
+          </a:p>
+        </p:txBody>
+      </p:sp>
+      <p:sp>
+        <p:nvSpPr>
+          <p:cNvPr id="3" name="Content Placeholder 2"/>
+          <p:cNvSpPr>
+            <a:spLocks noGrp="1"/>
+          </p:cNvSpPr>
+          <p:nvPr>
+            <p:ph idx="1"/>
+          </p:nvPr>
+        </p:nvSpPr>
+        <p:spPr>
+          <a:xfrm>
+            <a:off x="935736" y="1039368"/>
+            <a:ext cx="7772400" cy="4572000"/>
+          </a:xfrm>
+        </p:spPr>
+        <p:txBody>
+          <a:bodyPr>
+            <a:normAutofit/>
+          </a:bodyPr>
+          <a:lstStyle/>
+          <a:p>
+            <a:r>
+              <a:rPr lang="en-US" sz="2800" dirty="0" smtClean="0"/>
+              <a:t>The program runs other functions until the switch is pressed.</a:t>
+            </a:r>
+            <a:endParaRPr lang="en-US" sz="2800" dirty="0"/>
+          </a:p>
+          <a:p>
+            <a:r>
+              <a:rPr lang="en-US" sz="2800" dirty="0" smtClean="0"/>
+              <a:t>When the switch is pressed, it interrupts the program and runs it’s function. </a:t>
+            </a:r>
+          </a:p>
+          <a:p>
+            <a:endParaRPr lang="en-US" sz="2800" dirty="0"/>
+          </a:p>
+          <a:p>
+            <a:r>
+              <a:rPr lang="en-US" sz="2800" dirty="0" smtClean="0"/>
+              <a:t>Only certain pins can be interrupts.  Lecture 5 shows detailed steps how to work around this.</a:t>
+            </a:r>
+          </a:p>
+          <a:p>
+            <a:pPr marL="68580" indent="0">
+              <a:buNone/>
+            </a:pPr>
+            <a:endParaRPr lang="en-US" dirty="0"/>
+          </a:p>
+        </p:txBody>
+      </p:sp>
+      <p:pic>
+        <p:nvPicPr>
+          <p:cNvPr id="2050" name="Picture 2" descr="http://www.pyroelectro.com/tutorials/pic_interrupts_vs_polling/img/int.png"/>
+          <p:cNvPicPr>
+            <a:picLocks noChangeAspect="1" noChangeArrowheads="1"/>
+          </p:cNvPicPr>
+          <p:nvPr/>
+        </p:nvPicPr>
+        <p:blipFill>
+          <a:blip r:embed="rId2">
+            <a:extLst>
+              <a:ext uri="{28A0092B-C50C-407E-A947-70E740481C1C}">
+                <a14:useLocalDpi xmlns:a14="http://schemas.microsoft.com/office/drawing/2010/main" val="0"/>
+              </a:ext>
+            </a:extLst>
+          </a:blip>
+          <a:srcRect/>
+          <a:stretch>
+            <a:fillRect/>
+          </a:stretch>
+        </p:blipFill>
+        <p:spPr bwMode="auto">
+          <a:xfrm>
+            <a:off x="3200400" y="4419599"/>
+            <a:ext cx="3048000" cy="2386989"/>
+          </a:xfrm>
+          <a:prstGeom prst="rect">
+            <a:avLst/>
+          </a:prstGeom>
+          <a:noFill/>
+          <a:extLst>
+            <a:ext uri="{909E8E84-426E-40DD-AFC4-6F175D3DCCD1}">
+              <a14:hiddenFill xmlns:a14="http://schemas.microsoft.com/office/drawing/2010/main">
+                <a:solidFill>
+                  <a:srgbClr val="FFFFFF"/>
+                </a:solidFill>
+              </a14:hiddenFill>
+            </a:ext>
+          </a:extLst>
+        </p:spPr>
+      </p:pic>
+    </p:spTree>
+    <p:extLst>
+      <p:ext uri="{BB962C8B-B14F-4D97-AF65-F5344CB8AC3E}">
+        <p14:creationId xmlns:p14="http://schemas.microsoft.com/office/powerpoint/2010/main" val="3383491756"/>
+      </p:ext>
+    </p:extLst>
+  </p:cSld>
+  <p:clrMapOvr>
+    <a:masterClrMapping/>
+  </p:clrMapOvr>
+</p:sld>
+</file>
+
+<file path=ppt/slides/slide13.xml><?xml version="1.0" encoding="utf-8"?>
+<p:sld xmlns:a="http://schemas.openxmlformats.org/drawingml/2006/main" xmlns:r="http://schemas.openxmlformats.org/officeDocument/2006/relationships" xmlns:p="http://schemas.openxmlformats.org/presentationml/2006/main">
+  <p:cSld>
+    <p:spTree>
+      <p:nvGrpSpPr>
+        <p:cNvPr id="1" name=""/>
+        <p:cNvGrpSpPr/>
+        <p:nvPr/>
+      </p:nvGrpSpPr>
+      <p:grpSpPr>
+        <a:xfrm>
+          <a:off x="0" y="0"/>
+          <a:ext cx="0" cy="0"/>
+          <a:chOff x="0" y="0"/>
+          <a:chExt cx="0" cy="0"/>
+        </a:xfrm>
+      </p:grpSpPr>
+      <p:sp>
+        <p:nvSpPr>
+          <p:cNvPr id="2" name="Title 1"/>
+          <p:cNvSpPr>
+            <a:spLocks noGrp="1"/>
+          </p:cNvSpPr>
+          <p:nvPr>
+            <p:ph type="title"/>
+          </p:nvPr>
+        </p:nvSpPr>
+        <p:spPr/>
+        <p:txBody>
+          <a:bodyPr/>
+          <a:lstStyle/>
+          <a:p>
+            <a:r>
+              <a:rPr lang="en-US" dirty="0" smtClean="0"/>
+              <a:t>Lab Questions</a:t>
+            </a:r>
+            <a:endParaRPr lang="en-US" dirty="0"/>
+          </a:p>
+        </p:txBody>
+      </p:sp>
+      <p:sp>
+        <p:nvSpPr>
+          <p:cNvPr id="3" name="Content Placeholder 2"/>
+          <p:cNvSpPr>
+            <a:spLocks noGrp="1"/>
+          </p:cNvSpPr>
+          <p:nvPr>
+            <p:ph idx="1"/>
+          </p:nvPr>
+        </p:nvSpPr>
+        <p:spPr>
+          <a:xfrm>
+            <a:off x="457200" y="1426464"/>
+            <a:ext cx="8534400" cy="5202936"/>
+          </a:xfrm>
+        </p:spPr>
+        <p:txBody>
+          <a:bodyPr>
+            <a:normAutofit lnSpcReduction="10000"/>
+          </a:bodyPr>
+          <a:lstStyle/>
+          <a:p>
+            <a:pPr marL="68580" indent="0">
+              <a:buNone/>
+            </a:pPr>
+            <a:r>
+              <a:rPr lang="en-US" sz="2800" dirty="0" smtClean="0"/>
+              <a:t>Q: </a:t>
+            </a:r>
+            <a:r>
+              <a:rPr lang="en-US" sz="2800" dirty="0"/>
+              <a:t>Do you need to use internal pull-ups for the keys on the joystick shield</a:t>
+            </a:r>
+            <a:r>
+              <a:rPr lang="en-US" sz="2800" dirty="0" smtClean="0"/>
+              <a:t>?</a:t>
+            </a:r>
+          </a:p>
+          <a:p>
+            <a:pPr marL="68580" indent="0">
+              <a:buNone/>
+            </a:pPr>
+            <a:r>
+              <a:rPr lang="en-US" sz="2800" dirty="0" smtClean="0"/>
+              <a:t>A:</a:t>
+            </a:r>
+          </a:p>
+          <a:p>
+            <a:pPr marL="68580" indent="0">
+              <a:buNone/>
+            </a:pPr>
+            <a:endParaRPr lang="en-US" sz="2800" dirty="0"/>
+          </a:p>
+          <a:p>
+            <a:pPr marL="68580" indent="0">
+              <a:buNone/>
+            </a:pPr>
+            <a:r>
+              <a:rPr lang="en-US" sz="2800" dirty="0"/>
+              <a:t>Q:How would your code look like for switches which are connected to pull-down resistors instead of pull-up resistors?</a:t>
+            </a:r>
+          </a:p>
+          <a:p>
+            <a:pPr marL="68580" indent="0">
+              <a:buNone/>
+            </a:pPr>
+            <a:r>
+              <a:rPr lang="en-US" sz="2800" dirty="0" smtClean="0"/>
+              <a:t>A</a:t>
+            </a:r>
+            <a:r>
+              <a:rPr lang="en-US" sz="2800" dirty="0"/>
+              <a:t>:  PTAD = </a:t>
+            </a:r>
+            <a:r>
+              <a:rPr lang="en-US" sz="4000" dirty="0" smtClean="0"/>
+              <a:t>0</a:t>
+            </a:r>
+            <a:r>
+              <a:rPr lang="en-US" sz="2800" dirty="0" smtClean="0"/>
+              <a:t>xFF</a:t>
+            </a:r>
+            <a:r>
+              <a:rPr lang="en-US" sz="2800" dirty="0"/>
+              <a:t>; </a:t>
+            </a:r>
+            <a:r>
+              <a:rPr lang="en-US" sz="2800" dirty="0" smtClean="0"/>
+              <a:t>/// </a:t>
+            </a:r>
+            <a:r>
+              <a:rPr lang="en-US" sz="2800" dirty="0"/>
+              <a:t>write 1‘s to prevent false </a:t>
+            </a:r>
+            <a:r>
+              <a:rPr lang="en-US" sz="2800" dirty="0" smtClean="0"/>
+              <a:t>interrupts</a:t>
+            </a:r>
+          </a:p>
+          <a:p>
+            <a:pPr marL="68580" indent="0">
+              <a:buNone/>
+            </a:pPr>
+            <a:r>
+              <a:rPr lang="en-US" sz="2800" dirty="0"/>
+              <a:t>	 </a:t>
+            </a:r>
+            <a:r>
+              <a:rPr lang="en-US" sz="2800" dirty="0" smtClean="0"/>
+              <a:t>       to set as pull-down instead of pull-up</a:t>
+            </a:r>
+          </a:p>
+          <a:p>
+            <a:pPr marL="68580" indent="0">
+              <a:buNone/>
+            </a:pPr>
+            <a:r>
+              <a:rPr lang="en-US" sz="2800" dirty="0" smtClean="0"/>
+              <a:t>      </a:t>
+            </a:r>
+            <a:r>
+              <a:rPr lang="en-US" sz="2800" dirty="0"/>
+              <a:t>PTAD = </a:t>
+            </a:r>
+            <a:r>
+              <a:rPr lang="en-US" sz="4000" dirty="0" smtClean="0"/>
+              <a:t>0</a:t>
+            </a:r>
+            <a:r>
+              <a:rPr lang="en-US" sz="2800" dirty="0" smtClean="0"/>
+              <a:t>x</a:t>
+            </a:r>
+            <a:r>
+              <a:rPr lang="en-US" sz="4000" dirty="0" smtClean="0"/>
+              <a:t>00</a:t>
+            </a:r>
+            <a:r>
+              <a:rPr lang="en-US" sz="2800" dirty="0" smtClean="0"/>
+              <a:t>; </a:t>
+            </a:r>
+            <a:r>
+              <a:rPr lang="en-US" sz="2800" dirty="0"/>
+              <a:t>/// write </a:t>
+            </a:r>
+            <a:r>
+              <a:rPr lang="en-US" sz="3600" dirty="0" smtClean="0"/>
+              <a:t>0</a:t>
+            </a:r>
+            <a:r>
+              <a:rPr lang="en-US" sz="2800" dirty="0" smtClean="0"/>
+              <a:t>‘s </a:t>
+            </a:r>
+            <a:r>
+              <a:rPr lang="en-US" sz="2800" dirty="0"/>
+              <a:t>to prevent false </a:t>
+            </a:r>
+            <a:r>
+              <a:rPr lang="en-US" sz="2800" dirty="0" smtClean="0"/>
+              <a:t>interrupts </a:t>
+            </a:r>
+          </a:p>
+          <a:p>
+            <a:pPr marL="68580" indent="0">
+              <a:buNone/>
+            </a:pPr>
+            <a:endParaRPr lang="en-US" dirty="0"/>
+          </a:p>
+          <a:p>
+            <a:pPr marL="68580" indent="0">
+              <a:buNone/>
+            </a:pPr>
+            <a:endParaRPr lang="en-US" dirty="0"/>
+          </a:p>
+          <a:p>
+            <a:endParaRPr lang="en-US" dirty="0"/>
+          </a:p>
+        </p:txBody>
+      </p:sp>
+      <p:cxnSp>
+        <p:nvCxnSpPr>
+          <p:cNvPr id="5" name="Straight Arrow Connector 4"/>
+          <p:cNvCxnSpPr/>
+          <p:nvPr/>
+        </p:nvCxnSpPr>
+        <p:spPr>
+          <a:xfrm>
+            <a:off x="1828800" y="5105400"/>
+            <a:ext cx="0" cy="457200"/>
+          </a:xfrm>
+          <a:prstGeom prst="straightConnector1">
+            <a:avLst/>
+          </a:prstGeom>
+          <a:ln w="28575">
+            <a:solidFill>
+              <a:schemeClr val="tx1"/>
+            </a:solidFill>
+            <a:tailEnd type="triangle"/>
+          </a:ln>
+        </p:spPr>
+        <p:style>
+          <a:lnRef idx="1">
+            <a:schemeClr val="accent1"/>
+          </a:lnRef>
+          <a:fillRef idx="0">
+            <a:schemeClr val="accent1"/>
+          </a:fillRef>
+          <a:effectRef idx="0">
+            <a:schemeClr val="accent1"/>
+          </a:effectRef>
+          <a:fontRef idx="minor">
+            <a:schemeClr val="tx1"/>
+          </a:fontRef>
+        </p:style>
+      </p:cxnSp>
+      <p:cxnSp>
+        <p:nvCxnSpPr>
+          <p:cNvPr id="6" name="Straight Arrow Connector 5"/>
+          <p:cNvCxnSpPr/>
+          <p:nvPr/>
+        </p:nvCxnSpPr>
+        <p:spPr>
+          <a:xfrm>
+            <a:off x="7543800" y="5105400"/>
+            <a:ext cx="0" cy="457200"/>
+          </a:xfrm>
+          <a:prstGeom prst="straightConnector1">
+            <a:avLst/>
+          </a:prstGeom>
+          <a:ln w="28575">
+            <a:solidFill>
+              <a:schemeClr val="tx1"/>
+            </a:solidFill>
+            <a:tailEnd type="triangle"/>
+          </a:ln>
+        </p:spPr>
+        <p:style>
+          <a:lnRef idx="1">
+            <a:schemeClr val="accent1"/>
+          </a:lnRef>
+          <a:fillRef idx="0">
+            <a:schemeClr val="accent1"/>
+          </a:fillRef>
+          <a:effectRef idx="0">
+            <a:schemeClr val="accent1"/>
+          </a:effectRef>
+          <a:fontRef idx="minor">
+            <a:schemeClr val="tx1"/>
+          </a:fontRef>
+        </p:style>
+      </p:cxnSp>
+    </p:spTree>
+    <p:extLst>
+      <p:ext uri="{BB962C8B-B14F-4D97-AF65-F5344CB8AC3E}">
+        <p14:creationId xmlns:p14="http://schemas.microsoft.com/office/powerpoint/2010/main" val="3136318115"/>
+      </p:ext>
+    </p:extLst>
+  </p:cSld>
+  <p:clrMapOvr>
+    <a:masterClrMapping/>
+  </p:clrMapOvr>
+</p:sld>
+</file>
+
+<file path=ppt/slides/slide14.xml><?xml version="1.0" encoding="utf-8"?>
+<p:sld xmlns:a="http://schemas.openxmlformats.org/drawingml/2006/main" xmlns:r="http://schemas.openxmlformats.org/officeDocument/2006/relationships" xmlns:p="http://schemas.openxmlformats.org/presentationml/2006/main">
+  <p:cSld>
+    <p:spTree>
+      <p:nvGrpSpPr>
+        <p:cNvPr id="1" name=""/>
+        <p:cNvGrpSpPr/>
+        <p:nvPr/>
+      </p:nvGrpSpPr>
+      <p:grpSpPr>
+        <a:xfrm>
+          <a:off x="0" y="0"/>
+          <a:ext cx="0" cy="0"/>
+          <a:chOff x="0" y="0"/>
+          <a:chExt cx="0" cy="0"/>
+        </a:xfrm>
+      </p:grpSpPr>
+      <p:sp>
+        <p:nvSpPr>
+          <p:cNvPr id="2" name="Title 1"/>
+          <p:cNvSpPr>
+            <a:spLocks noGrp="1"/>
+          </p:cNvSpPr>
+          <p:nvPr>
+            <p:ph type="title"/>
+          </p:nvPr>
+        </p:nvSpPr>
+        <p:spPr/>
+        <p:txBody>
+          <a:bodyPr/>
+          <a:lstStyle/>
+          <a:p>
+            <a:r>
+              <a:rPr lang="en-US" dirty="0" smtClean="0"/>
+              <a:t>Lab Questions: Continued</a:t>
+            </a:r>
+            <a:endParaRPr lang="en-US" dirty="0"/>
+          </a:p>
+        </p:txBody>
+      </p:sp>
+      <p:sp>
+        <p:nvSpPr>
+          <p:cNvPr id="3" name="Content Placeholder 2"/>
+          <p:cNvSpPr>
+            <a:spLocks noGrp="1"/>
+          </p:cNvSpPr>
+          <p:nvPr>
+            <p:ph idx="1"/>
+          </p:nvPr>
+        </p:nvSpPr>
+        <p:spPr/>
+        <p:txBody>
+          <a:bodyPr>
+            <a:normAutofit/>
+          </a:bodyPr>
+          <a:lstStyle/>
+          <a:p>
+            <a:r>
+              <a:rPr lang="en-US" dirty="0"/>
+              <a:t>Q: </a:t>
+            </a:r>
+            <a:r>
+              <a:rPr lang="en-US" sz="2400" dirty="0"/>
+              <a:t>What fundamental steps are required on the FRDM board to use the reset button as user button? What is the advantage of this? What is the disadvantage of this? Hint: think about the power-on-reset (boot) sequence of the microcontroller: how long is the reset button functionality present? Would the timing be a possible problem? Could there be a situation where it would not be possible to reset the board</a:t>
+            </a:r>
+            <a:r>
+              <a:rPr lang="en-US" sz="2400" dirty="0" smtClean="0"/>
+              <a:t>?</a:t>
+            </a:r>
+          </a:p>
+          <a:p>
+            <a:endParaRPr lang="en-US" sz="2400" dirty="0"/>
+          </a:p>
+        </p:txBody>
+      </p:sp>
+    </p:spTree>
+    <p:extLst>
+      <p:ext uri="{BB962C8B-B14F-4D97-AF65-F5344CB8AC3E}">
+        <p14:creationId xmlns:p14="http://schemas.microsoft.com/office/powerpoint/2010/main" val="589821949"/>
+      </p:ext>
+    </p:extLst>
+  </p:cSld>
+  <p:clrMapOvr>
+    <a:masterClrMapping/>
+  </p:clrMapOvr>
+</p:sld>
+</file>
+
 <file path=ppt/slides/slide2.xml><?xml version="1.0" encoding="utf-8"?>
 <p:sld xmlns:a="http://schemas.openxmlformats.org/drawingml/2006/main" xmlns:r="http://schemas.openxmlformats.org/officeDocument/2006/relationships" xmlns:p="http://schemas.openxmlformats.org/presentationml/2006/main">
   <p:cSld>
@@ -7041,7 +8270,12 @@
             <p:ph type="title"/>
           </p:nvPr>
         </p:nvSpPr>
-        <p:spPr/>
+        <p:spPr>
+          <a:xfrm>
+            <a:off x="914400" y="512064"/>
+            <a:ext cx="7772400" cy="1088136"/>
+          </a:xfrm>
+        </p:spPr>
         <p:txBody>
           <a:bodyPr/>
           <a:lstStyle/>
@@ -7050,6 +8284,9 @@
               <a:rPr lang="en-US" dirty="0" smtClean="0"/>
               <a:t>Keys</a:t>
             </a:r>
+            <a:br>
+              <a:rPr lang="en-US" dirty="0" smtClean="0"/>
+            </a:br>
             <a:endParaRPr lang="en-US" dirty="0"/>
           </a:p>
         </p:txBody>
@@ -7064,16 +8301,291 @@
             <p:ph idx="1"/>
           </p:nvPr>
         </p:nvSpPr>
-        <p:spPr/>
+        <p:spPr>
+          <a:xfrm>
+            <a:off x="914400" y="1600200"/>
+            <a:ext cx="7772400" cy="4755360"/>
+          </a:xfrm>
+        </p:spPr>
         <p:txBody>
           <a:bodyPr/>
           <a:lstStyle/>
           <a:p>
-            <a:endParaRPr lang="en-US"/>
+            <a:r>
+              <a:rPr lang="en-US" dirty="0" smtClean="0"/>
+              <a:t>Using switches to trigger an event in the software</a:t>
+            </a:r>
+          </a:p>
+          <a:p>
+            <a:endParaRPr lang="en-US" dirty="0"/>
+          </a:p>
+          <a:p>
+            <a:r>
+              <a:rPr lang="en-US" dirty="0" smtClean="0"/>
+              <a:t>Must consider:</a:t>
+            </a:r>
+          </a:p>
+          <a:p>
+            <a:pPr lvl="1">
+              <a:buClr>
+                <a:schemeClr val="tx1"/>
+              </a:buClr>
+              <a:buFont typeface="Wingdings" panose="05000000000000000000" pitchFamily="2" charset="2"/>
+              <a:buChar char=""/>
+            </a:pPr>
+            <a:r>
+              <a:rPr lang="en-US" dirty="0" smtClean="0"/>
+              <a:t>Pull Up/ Pull Down Resistors</a:t>
+            </a:r>
+          </a:p>
+          <a:p>
+            <a:pPr lvl="4">
+              <a:buClr>
+                <a:schemeClr val="tx1"/>
+              </a:buClr>
+              <a:buFont typeface="Wingdings" panose="05000000000000000000" pitchFamily="2" charset="2"/>
+              <a:buChar char=""/>
+            </a:pPr>
+            <a:r>
+              <a:rPr lang="en-US" dirty="0" smtClean="0"/>
+              <a:t>External Resistors</a:t>
+            </a:r>
+          </a:p>
+          <a:p>
+            <a:pPr lvl="4">
+              <a:buClr>
+                <a:schemeClr val="tx1"/>
+              </a:buClr>
+              <a:buFont typeface="Wingdings" panose="05000000000000000000" pitchFamily="2" charset="2"/>
+              <a:buChar char=""/>
+            </a:pPr>
+            <a:r>
+              <a:rPr lang="en-US" dirty="0" smtClean="0"/>
+              <a:t>Internal Resistors</a:t>
+            </a:r>
+          </a:p>
+          <a:p>
+            <a:pPr lvl="1">
+              <a:buClr>
+                <a:schemeClr val="tx1"/>
+              </a:buClr>
+              <a:buFont typeface="Wingdings" panose="05000000000000000000" pitchFamily="2" charset="2"/>
+              <a:buChar char=""/>
+            </a:pPr>
+            <a:r>
+              <a:rPr lang="en-US" dirty="0" smtClean="0"/>
+              <a:t>Proper Synchronization</a:t>
+            </a:r>
+          </a:p>
+          <a:p>
+            <a:pPr lvl="4">
+              <a:buClr>
+                <a:schemeClr val="tx1"/>
+              </a:buClr>
+              <a:buFont typeface="Wingdings" panose="05000000000000000000" pitchFamily="2" charset="2"/>
+              <a:buChar char=""/>
+            </a:pPr>
+            <a:r>
+              <a:rPr lang="en-US" sz="2300" dirty="0" smtClean="0"/>
+              <a:t>Real time/Gadfly Synchronization</a:t>
+            </a:r>
+          </a:p>
+          <a:p>
+            <a:pPr lvl="4">
+              <a:buClr>
+                <a:schemeClr val="tx1"/>
+              </a:buClr>
+              <a:buFont typeface="Wingdings" panose="05000000000000000000" pitchFamily="2" charset="2"/>
+              <a:buChar char=""/>
+            </a:pPr>
+            <a:r>
+              <a:rPr lang="en-US" sz="2300" dirty="0" smtClean="0"/>
+              <a:t>Interrupt Synchronization</a:t>
+            </a:r>
+          </a:p>
+          <a:p>
+            <a:pPr lvl="1">
+              <a:buClr>
+                <a:schemeClr val="tx1"/>
+              </a:buClr>
+            </a:pPr>
+            <a:endParaRPr lang="en-US" dirty="0" smtClean="0"/>
+          </a:p>
+          <a:p>
+            <a:endParaRPr lang="en-US" dirty="0"/>
           </a:p>
         </p:txBody>
       </p:sp>
     </p:spTree>
+  </p:cSld>
+  <p:clrMapOvr>
+    <a:masterClrMapping/>
+  </p:clrMapOvr>
+</p:sld>
+</file>
+
+<file path=ppt/slides/slide9.xml><?xml version="1.0" encoding="utf-8"?>
+<p:sld xmlns:a="http://schemas.openxmlformats.org/drawingml/2006/main" xmlns:r="http://schemas.openxmlformats.org/officeDocument/2006/relationships" xmlns:p="http://schemas.openxmlformats.org/presentationml/2006/main">
+  <p:cSld>
+    <p:spTree>
+      <p:nvGrpSpPr>
+        <p:cNvPr id="1" name=""/>
+        <p:cNvGrpSpPr/>
+        <p:nvPr/>
+      </p:nvGrpSpPr>
+      <p:grpSpPr>
+        <a:xfrm>
+          <a:off x="0" y="0"/>
+          <a:ext cx="0" cy="0"/>
+          <a:chOff x="0" y="0"/>
+          <a:chExt cx="0" cy="0"/>
+        </a:xfrm>
+      </p:grpSpPr>
+      <p:sp>
+        <p:nvSpPr>
+          <p:cNvPr id="2" name="Title 1"/>
+          <p:cNvSpPr>
+            <a:spLocks noGrp="1"/>
+          </p:cNvSpPr>
+          <p:nvPr>
+            <p:ph type="title"/>
+          </p:nvPr>
+        </p:nvSpPr>
+        <p:spPr/>
+        <p:txBody>
+          <a:bodyPr/>
+          <a:lstStyle/>
+          <a:p>
+            <a:r>
+              <a:rPr lang="en-US" dirty="0" smtClean="0"/>
+              <a:t>Keys: Pull Up/Down Resistors</a:t>
+            </a:r>
+            <a:endParaRPr lang="en-US" dirty="0"/>
+          </a:p>
+        </p:txBody>
+      </p:sp>
+      <p:sp>
+        <p:nvSpPr>
+          <p:cNvPr id="3" name="Content Placeholder 2"/>
+          <p:cNvSpPr>
+            <a:spLocks noGrp="1"/>
+          </p:cNvSpPr>
+          <p:nvPr>
+            <p:ph idx="1"/>
+          </p:nvPr>
+        </p:nvSpPr>
+        <p:spPr>
+          <a:xfrm>
+            <a:off x="419100" y="1676400"/>
+            <a:ext cx="5921960" cy="4581624"/>
+          </a:xfrm>
+        </p:spPr>
+        <p:txBody>
+          <a:bodyPr/>
+          <a:lstStyle/>
+          <a:p>
+            <a:r>
+              <a:rPr lang="en-US" dirty="0" smtClean="0"/>
+              <a:t>No pull up/down = floating values</a:t>
+            </a:r>
+          </a:p>
+          <a:p>
+            <a:r>
+              <a:rPr lang="en-US" dirty="0" smtClean="0"/>
+              <a:t>Floating values cause false triggers in the switch</a:t>
+            </a:r>
+          </a:p>
+          <a:p>
+            <a:endParaRPr lang="en-US" dirty="0" smtClean="0"/>
+          </a:p>
+          <a:p>
+            <a:endParaRPr lang="en-US" dirty="0"/>
+          </a:p>
+          <a:p>
+            <a:r>
+              <a:rPr lang="en-US" dirty="0" smtClean="0"/>
+              <a:t>By adding a resistor to ground or VCC we can always keep a defined state of HIGH or LOW, preventing false triggers</a:t>
+            </a:r>
+          </a:p>
+          <a:p>
+            <a:endParaRPr lang="en-US" dirty="0"/>
+          </a:p>
+          <a:p>
+            <a:endParaRPr lang="en-US" dirty="0"/>
+          </a:p>
+        </p:txBody>
+      </p:sp>
+      <p:pic>
+        <p:nvPicPr>
+          <p:cNvPr id="1028" name="Picture 4" descr="http://images.elektroda.net/37_1290066934.png"/>
+          <p:cNvPicPr>
+            <a:picLocks noChangeAspect="1" noChangeArrowheads="1"/>
+          </p:cNvPicPr>
+          <p:nvPr/>
+        </p:nvPicPr>
+        <p:blipFill>
+          <a:blip r:embed="rId3">
+            <a:extLst>
+              <a:ext uri="{28A0092B-C50C-407E-A947-70E740481C1C}">
+                <a14:useLocalDpi xmlns:a14="http://schemas.microsoft.com/office/drawing/2010/main" val="0"/>
+              </a:ext>
+            </a:extLst>
+          </a:blip>
+          <a:srcRect/>
+          <a:stretch>
+            <a:fillRect/>
+          </a:stretch>
+        </p:blipFill>
+        <p:spPr bwMode="auto">
+          <a:xfrm>
+            <a:off x="6341060" y="3505200"/>
+            <a:ext cx="2672179" cy="3231360"/>
+          </a:xfrm>
+          <a:prstGeom prst="rect">
+            <a:avLst/>
+          </a:prstGeom>
+          <a:noFill/>
+          <a:extLst>
+            <a:ext uri="{909E8E84-426E-40DD-AFC4-6F175D3DCCD1}">
+              <a14:hiddenFill xmlns:a14="http://schemas.microsoft.com/office/drawing/2010/main">
+                <a:solidFill>
+                  <a:srgbClr val="FFFFFF"/>
+                </a:solidFill>
+              </a14:hiddenFill>
+            </a:ext>
+          </a:extLst>
+        </p:spPr>
+      </p:pic>
+      <p:pic>
+        <p:nvPicPr>
+          <p:cNvPr id="4" name="Picture 3"/>
+          <p:cNvPicPr>
+            <a:picLocks noChangeAspect="1"/>
+          </p:cNvPicPr>
+          <p:nvPr/>
+        </p:nvPicPr>
+        <p:blipFill>
+          <a:blip r:embed="rId4"/>
+          <a:stretch>
+            <a:fillRect/>
+          </a:stretch>
+        </p:blipFill>
+        <p:spPr>
+          <a:xfrm>
+            <a:off x="6384339" y="1219200"/>
+            <a:ext cx="2628900" cy="2168843"/>
+          </a:xfrm>
+          <a:prstGeom prst="rect">
+            <a:avLst/>
+          </a:prstGeom>
+        </p:spPr>
+      </p:pic>
+    </p:spTree>
+    <p:extLst>
+      <p:ext uri="{BB962C8B-B14F-4D97-AF65-F5344CB8AC3E}">
+        <p14:creationId xmlns:p14="http://schemas.microsoft.com/office/powerpoint/2010/main" val="1652423782"/>
+      </p:ext>
+    </p:extLst>
   </p:cSld>
   <p:clrMapOvr>
     <a:masterClrMapping/>
@@ -7406,4 +8918,265 @@
   <a:objectDefaults/>
   <a:extraClrSchemeLst/>
 </a:theme>
+</file>
+
+<file path=ppt/theme/theme2.xml><?xml version="1.0" encoding="utf-8"?>
+<a:theme xmlns:a="http://schemas.openxmlformats.org/drawingml/2006/main" name="Office Theme">
+  <a:themeElements>
+    <a:clrScheme name="Office">
+      <a:dk1>
+        <a:sysClr val="windowText" lastClr="000000"/>
+      </a:dk1>
+      <a:lt1>
+        <a:sysClr val="window" lastClr="FFFFFF"/>
+      </a:lt1>
+      <a:dk2>
+        <a:srgbClr val="44546A"/>
+      </a:dk2>
+      <a:lt2>
+        <a:srgbClr val="E7E6E6"/>
+      </a:lt2>
+      <a:accent1>
+        <a:srgbClr val="5B9BD5"/>
+      </a:accent1>
+      <a:accent2>
+        <a:srgbClr val="ED7D31"/>
+      </a:accent2>
+      <a:accent3>
+        <a:srgbClr val="A5A5A5"/>
+      </a:accent3>
+      <a:accent4>
+        <a:srgbClr val="FFC000"/>
+      </a:accent4>
+      <a:accent5>
+        <a:srgbClr val="4472C4"/>
+      </a:accent5>
+      <a:accent6>
+        <a:srgbClr val="70AD47"/>
+      </a:accent6>
+      <a:hlink>
+        <a:srgbClr val="0563C1"/>
+      </a:hlink>
+      <a:folHlink>
+        <a:srgbClr val="954F72"/>
+      </a:folHlink>
+    </a:clrScheme>
+    <a:fontScheme name="Office">
+      <a:majorFont>
+        <a:latin typeface="Calibri Light" panose="020F0302020204030204"/>
+        <a:ea typeface=""/>
+        <a:cs typeface=""/>
+        <a:font script="Jpan" typeface="ＭＳ Ｐゴシック"/>
+        <a:font script="Hang" typeface="맑은 고딕"/>
+        <a:font script="Hans" typeface="宋体"/>
+        <a:font script="Hant" typeface="新細明體"/>
+        <a:font script="Arab" typeface="Times New Roman"/>
+        <a:font script="Hebr" typeface="Times New Roman"/>
+        <a:font script="Thai" typeface="Angsana New"/>
+        <a:font script="Ethi" typeface="Nyala"/>
+        <a:font script="Beng" typeface="Vrinda"/>
+        <a:font script="Gujr" typeface="Shruti"/>
+        <a:font script="Khmr" typeface="MoolBoran"/>
+        <a:font script="Knda" typeface="Tunga"/>
+        <a:font script="Guru" typeface="Raavi"/>
+        <a:font script="Cans" typeface="Euphemia"/>
+        <a:font script="Cher" typeface="Plantagenet Cherokee"/>
+        <a:font script="Yiii" typeface="Microsoft Yi Baiti"/>
+        <a:font script="Tibt" typeface="Microsoft Himalaya"/>
+        <a:font script="Thaa" typeface="MV Boli"/>
+        <a:font script="Deva" typeface="Mangal"/>
+        <a:font script="Telu" typeface="Gautami"/>
+        <a:font script="Taml" typeface="Latha"/>
+        <a:font script="Syrc" typeface="Estrangelo Edessa"/>
+        <a:font script="Orya" typeface="Kalinga"/>
+        <a:font script="Mlym" typeface="Kartika"/>
+        <a:font script="Laoo" typeface="DokChampa"/>
+        <a:font script="Sinh" typeface="Iskoola Pota"/>
+        <a:font script="Mong" typeface="Mongolian Baiti"/>
+        <a:font script="Viet" typeface="Times New Roman"/>
+        <a:font script="Uigh" typeface="Microsoft Uighur"/>
+        <a:font script="Geor" typeface="Sylfaen"/>
+      </a:majorFont>
+      <a:minorFont>
+        <a:latin typeface="Calibri" panose="020F0502020204030204"/>
+        <a:ea typeface=""/>
+        <a:cs typeface=""/>
+        <a:font script="Jpan" typeface="ＭＳ Ｐゴシック"/>
+        <a:font script="Hang" typeface="맑은 고딕"/>
+        <a:font script="Hans" typeface="宋体"/>
+        <a:font script="Hant" typeface="新細明體"/>
+        <a:font script="Arab" typeface="Arial"/>
+        <a:font script="Hebr" typeface="Arial"/>
+        <a:font script="Thai" typeface="Cordia New"/>
+        <a:font script="Ethi" typeface="Nyala"/>
+        <a:font script="Beng" typeface="Vrinda"/>
+        <a:font script="Gujr" typeface="Shruti"/>
+        <a:font script="Khmr" typeface="DaunPenh"/>
+        <a:font script="Knda" typeface="Tunga"/>
+        <a:font script="Guru" typeface="Raavi"/>
+        <a:font script="Cans" typeface="Euphemia"/>
+        <a:font script="Cher" typeface="Plantagenet Cherokee"/>
+        <a:font script="Yiii" typeface="Microsoft Yi Baiti"/>
+        <a:font script="Tibt" typeface="Microsoft Himalaya"/>
+        <a:font script="Thaa" typeface="MV Boli"/>
+        <a:font script="Deva" typeface="Mangal"/>
+        <a:font script="Telu" typeface="Gautami"/>
+        <a:font script="Taml" typeface="Latha"/>
+        <a:font script="Syrc" typeface="Estrangelo Edessa"/>
+        <a:font script="Orya" typeface="Kalinga"/>
+        <a:font script="Mlym" typeface="Kartika"/>
+        <a:font script="Laoo" typeface="DokChampa"/>
+        <a:font script="Sinh" typeface="Iskoola Pota"/>
+        <a:font script="Mong" typeface="Mongolian Baiti"/>
+        <a:font script="Viet" typeface="Arial"/>
+        <a:font script="Uigh" typeface="Microsoft Uighur"/>
+        <a:font script="Geor" typeface="Sylfaen"/>
+      </a:minorFont>
+    </a:fontScheme>
+    <a:fmtScheme name="Office">
+      <a:fillStyleLst>
+        <a:solidFill>
+          <a:schemeClr val="phClr"/>
+        </a:solidFill>
+        <a:gradFill rotWithShape="1">
+          <a:gsLst>
+            <a:gs pos="0">
+              <a:schemeClr val="phClr">
+                <a:lumMod val="110000"/>
+                <a:satMod val="105000"/>
+                <a:tint val="67000"/>
+              </a:schemeClr>
+            </a:gs>
+            <a:gs pos="50000">
+              <a:schemeClr val="phClr">
+                <a:lumMod val="105000"/>
+                <a:satMod val="103000"/>
+                <a:tint val="73000"/>
+              </a:schemeClr>
+            </a:gs>
+            <a:gs pos="100000">
+              <a:schemeClr val="phClr">
+                <a:lumMod val="105000"/>
+                <a:satMod val="109000"/>
+                <a:tint val="81000"/>
+              </a:schemeClr>
+            </a:gs>
+          </a:gsLst>
+          <a:lin ang="5400000" scaled="0"/>
+        </a:gradFill>
+        <a:gradFill rotWithShape="1">
+          <a:gsLst>
+            <a:gs pos="0">
+              <a:schemeClr val="phClr">
+                <a:satMod val="103000"/>
+                <a:lumMod val="102000"/>
+                <a:tint val="94000"/>
+              </a:schemeClr>
+            </a:gs>
+            <a:gs pos="50000">
+              <a:schemeClr val="phClr">
+                <a:satMod val="110000"/>
+                <a:lumMod val="100000"/>
+                <a:shade val="100000"/>
+              </a:schemeClr>
+            </a:gs>
+            <a:gs pos="100000">
+              <a:schemeClr val="phClr">
+                <a:lumMod val="99000"/>
+                <a:satMod val="120000"/>
+                <a:shade val="78000"/>
+              </a:schemeClr>
+            </a:gs>
+          </a:gsLst>
+          <a:lin ang="5400000" scaled="0"/>
+        </a:gradFill>
+      </a:fillStyleLst>
+      <a:lnStyleLst>
+        <a:ln w="6350" cap="flat" cmpd="sng" algn="ctr">
+          <a:solidFill>
+            <a:schemeClr val="phClr"/>
+          </a:solidFill>
+          <a:prstDash val="solid"/>
+          <a:miter lim="800000"/>
+        </a:ln>
+        <a:ln w="12700" cap="flat" cmpd="sng" algn="ctr">
+          <a:solidFill>
+            <a:schemeClr val="phClr"/>
+          </a:solidFill>
+          <a:prstDash val="solid"/>
+          <a:miter lim="800000"/>
+        </a:ln>
+        <a:ln w="19050" cap="flat" cmpd="sng" algn="ctr">
+          <a:solidFill>
+            <a:schemeClr val="phClr"/>
+          </a:solidFill>
+          <a:prstDash val="solid"/>
+          <a:miter lim="800000"/>
+        </a:ln>
+      </a:lnStyleLst>
+      <a:effectStyleLst>
+        <a:effectStyle>
+          <a:effectLst/>
+        </a:effectStyle>
+        <a:effectStyle>
+          <a:effectLst/>
+        </a:effectStyle>
+        <a:effectStyle>
+          <a:effectLst>
+            <a:outerShdw blurRad="57150" dist="19050" dir="5400000" algn="ctr" rotWithShape="0">
+              <a:srgbClr val="000000">
+                <a:alpha val="63000"/>
+              </a:srgbClr>
+            </a:outerShdw>
+          </a:effectLst>
+        </a:effectStyle>
+      </a:effectStyleLst>
+      <a:bgFillStyleLst>
+        <a:solidFill>
+          <a:schemeClr val="phClr"/>
+        </a:solidFill>
+        <a:solidFill>
+          <a:schemeClr val="phClr">
+            <a:tint val="95000"/>
+            <a:satMod val="170000"/>
+          </a:schemeClr>
+        </a:solidFill>
+        <a:gradFill rotWithShape="1">
+          <a:gsLst>
+            <a:gs pos="0">
+              <a:schemeClr val="phClr">
+                <a:tint val="93000"/>
+                <a:satMod val="150000"/>
+                <a:shade val="98000"/>
+                <a:lumMod val="102000"/>
+              </a:schemeClr>
+            </a:gs>
+            <a:gs pos="50000">
+              <a:schemeClr val="phClr">
+                <a:tint val="98000"/>
+                <a:satMod val="130000"/>
+                <a:shade val="90000"/>
+                <a:lumMod val="103000"/>
+              </a:schemeClr>
+            </a:gs>
+            <a:gs pos="100000">
+              <a:schemeClr val="phClr">
+                <a:shade val="63000"/>
+                <a:satMod val="120000"/>
+              </a:schemeClr>
+            </a:gs>
+          </a:gsLst>
+          <a:lin ang="5400000" scaled="0"/>
+        </a:gradFill>
+      </a:bgFillStyleLst>
+    </a:fmtScheme>
+  </a:themeElements>
+  <a:objectDefaults/>
+  <a:extraClrSchemeLst/>
+  <a:extLst>
+    <a:ext uri="{05A4C25C-085E-4340-85A3-A5531E510DB2}">
+      <thm15:themeFamily xmlns:thm15="http://schemas.microsoft.com/office/thememl/2012/main" name="Office Theme" id="{62F939B6-93AF-4DB8-9C6B-D6C7DFDC589F}" vid="{4A3C46E8-61CC-4603-A589-7422A47A8E4A}"/>
+    </a:ext>
+  </a:extLst>
+</a:theme>
 </file>
</xml_diff>

<commit_message>
updated final version of state machines
</commit_message>
<xml_diff>
--- a/Projects/recap/week5a_recap.pptx
+++ b/Projects/recap/week5a_recap.pptx
@@ -5,23 +5,24 @@
     <p:sldMasterId id="2147483660" r:id="rId1"/>
   </p:sldMasterIdLst>
   <p:notesMasterIdLst>
-    <p:notesMasterId r:id="rId16"/>
+    <p:notesMasterId r:id="rId17"/>
   </p:notesMasterIdLst>
   <p:sldIdLst>
     <p:sldId id="256" r:id="rId2"/>
-    <p:sldId id="257" r:id="rId3"/>
-    <p:sldId id="258" r:id="rId4"/>
-    <p:sldId id="262" r:id="rId5"/>
-    <p:sldId id="263" r:id="rId6"/>
-    <p:sldId id="259" r:id="rId7"/>
-    <p:sldId id="261" r:id="rId8"/>
-    <p:sldId id="260" r:id="rId9"/>
-    <p:sldId id="264" r:id="rId10"/>
-    <p:sldId id="267" r:id="rId11"/>
-    <p:sldId id="265" r:id="rId12"/>
-    <p:sldId id="266" r:id="rId13"/>
-    <p:sldId id="268" r:id="rId14"/>
-    <p:sldId id="269" r:id="rId15"/>
+    <p:sldId id="270" r:id="rId3"/>
+    <p:sldId id="257" r:id="rId4"/>
+    <p:sldId id="258" r:id="rId5"/>
+    <p:sldId id="262" r:id="rId6"/>
+    <p:sldId id="263" r:id="rId7"/>
+    <p:sldId id="259" r:id="rId8"/>
+    <p:sldId id="261" r:id="rId9"/>
+    <p:sldId id="260" r:id="rId10"/>
+    <p:sldId id="264" r:id="rId11"/>
+    <p:sldId id="267" r:id="rId12"/>
+    <p:sldId id="265" r:id="rId13"/>
+    <p:sldId id="266" r:id="rId14"/>
+    <p:sldId id="268" r:id="rId15"/>
+    <p:sldId id="269" r:id="rId16"/>
   </p:sldIdLst>
   <p:sldSz cx="9144000" cy="6858000" type="screen4x3"/>
   <p:notesSz cx="6858000" cy="9144000"/>
@@ -122,7 +123,7 @@
   </p:defaultTextStyle>
   <p:extLst>
     <p:ext uri="{EFAFB233-063F-42B5-8137-9DF3F51BA10A}">
-      <p15:sldGuideLst xmlns:p15="http://schemas.microsoft.com/office/powerpoint/2012/main">
+      <p15:sldGuideLst xmlns:p15="http://schemas.microsoft.com/office/powerpoint/2012/main" xmlns="">
         <p15:guide id="1" orient="horz" pos="2160">
           <p15:clr>
             <a:srgbClr val="A4A3A4"/>
@@ -144,7 +145,7 @@
   <p:cmAuthor id="1" name="Kiefer Capps" initials="KC" lastIdx="0" clrIdx="0">
     <p:extLst>
       <p:ext uri="{19B8F6BF-5375-455C-9EA6-DF929625EA0E}">
-        <p15:presenceInfo xmlns:p15="http://schemas.microsoft.com/office/powerpoint/2012/main" userId="cda3282c4b2dace2" providerId="Windows Live"/>
+        <p15:presenceInfo xmlns:p15="http://schemas.microsoft.com/office/powerpoint/2012/main" xmlns="" userId="cda3282c4b2dace2" providerId="Windows Live"/>
       </p:ext>
     </p:extLst>
   </p:cmAuthor>
@@ -233,6 +234,7 @@
           <a:p>
             <a:fld id="{8E9F2F70-7F24-48F2-BAC3-4187E7DFC08C}" type="datetimeFigureOut">
               <a:rPr lang="en-US" smtClean="0"/>
+              <a:pPr/>
               <a:t>3/22/2015</a:t>
             </a:fld>
             <a:endParaRPr lang="en-US"/>
@@ -392,6 +394,7 @@
           <a:p>
             <a:fld id="{CCBC314B-187C-49E7-BB8E-DAC293939B19}" type="slidenum">
               <a:rPr lang="en-US" smtClean="0"/>
+              <a:pPr/>
               <a:t>‹#›</a:t>
             </a:fld>
             <a:endParaRPr lang="en-US"/>
@@ -401,7 +404,7 @@
     </p:spTree>
     <p:extLst>
       <p:ext uri="{BB962C8B-B14F-4D97-AF65-F5344CB8AC3E}">
-        <p14:creationId xmlns:p14="http://schemas.microsoft.com/office/powerpoint/2010/main" val="2313597806"/>
+        <p14:creationId xmlns:p14="http://schemas.microsoft.com/office/powerpoint/2010/main" xmlns="" val="2313597806"/>
       </p:ext>
     </p:extLst>
   </p:cSld>
@@ -566,7 +569,8 @@
           <a:p>
             <a:fld id="{CCBC314B-187C-49E7-BB8E-DAC293939B19}" type="slidenum">
               <a:rPr lang="en-US" smtClean="0"/>
-              <a:t>9</a:t>
+              <a:pPr/>
+              <a:t>10</a:t>
             </a:fld>
             <a:endParaRPr lang="en-US"/>
           </a:p>
@@ -575,7 +579,7 @@
     </p:spTree>
     <p:extLst>
       <p:ext uri="{BB962C8B-B14F-4D97-AF65-F5344CB8AC3E}">
-        <p14:creationId xmlns:p14="http://schemas.microsoft.com/office/powerpoint/2010/main" val="451756191"/>
+        <p14:creationId xmlns:p14="http://schemas.microsoft.com/office/powerpoint/2010/main" xmlns="" val="451756191"/>
       </p:ext>
     </p:extLst>
   </p:cSld>
@@ -621,6 +625,7 @@
           <a:p>
             <a:fld id="{93612900-739A-42EB-8572-C4EB7D3F20C3}" type="datetimeFigureOut">
               <a:rPr lang="en-US" smtClean="0"/>
+              <a:pPr/>
               <a:t>3/22/2015</a:t>
             </a:fld>
             <a:endParaRPr lang="en-US"/>
@@ -667,6 +672,7 @@
           <a:p>
             <a:fld id="{96F83EBD-BA68-4486-888E-498FC60E7D58}" type="slidenum">
               <a:rPr lang="en-US" smtClean="0"/>
+              <a:pPr/>
               <a:t>‹#›</a:t>
             </a:fld>
             <a:endParaRPr lang="en-US"/>
@@ -1338,6 +1344,7 @@
           <a:p>
             <a:fld id="{93612900-739A-42EB-8572-C4EB7D3F20C3}" type="datetimeFigureOut">
               <a:rPr lang="en-US" smtClean="0"/>
+              <a:pPr/>
               <a:t>3/22/2015</a:t>
             </a:fld>
             <a:endParaRPr lang="en-US"/>
@@ -1384,6 +1391,7 @@
           <a:p>
             <a:fld id="{96F83EBD-BA68-4486-888E-498FC60E7D58}" type="slidenum">
               <a:rPr lang="en-US" smtClean="0"/>
+              <a:pPr/>
               <a:t>‹#›</a:t>
             </a:fld>
             <a:endParaRPr lang="en-US"/>
@@ -1523,6 +1531,7 @@
           <a:p>
             <a:fld id="{93612900-739A-42EB-8572-C4EB7D3F20C3}" type="datetimeFigureOut">
               <a:rPr lang="en-US" smtClean="0"/>
+              <a:pPr/>
               <a:t>3/22/2015</a:t>
             </a:fld>
             <a:endParaRPr lang="en-US"/>
@@ -1569,6 +1578,7 @@
           <a:p>
             <a:fld id="{96F83EBD-BA68-4486-888E-498FC60E7D58}" type="slidenum">
               <a:rPr lang="en-US" smtClean="0"/>
+              <a:pPr/>
               <a:t>‹#›</a:t>
             </a:fld>
             <a:endParaRPr lang="en-US"/>
@@ -1698,6 +1708,7 @@
           <a:p>
             <a:fld id="{93612900-739A-42EB-8572-C4EB7D3F20C3}" type="datetimeFigureOut">
               <a:rPr lang="en-US" smtClean="0"/>
+              <a:pPr/>
               <a:t>3/22/2015</a:t>
             </a:fld>
             <a:endParaRPr lang="en-US"/>
@@ -1744,6 +1755,7 @@
           <a:p>
             <a:fld id="{96F83EBD-BA68-4486-888E-498FC60E7D58}" type="slidenum">
               <a:rPr lang="en-US" smtClean="0"/>
+              <a:pPr/>
               <a:t>‹#›</a:t>
             </a:fld>
             <a:endParaRPr lang="en-US"/>
@@ -3181,6 +3193,7 @@
           <a:p>
             <a:fld id="{93612900-739A-42EB-8572-C4EB7D3F20C3}" type="datetimeFigureOut">
               <a:rPr lang="en-US" smtClean="0"/>
+              <a:pPr/>
               <a:t>3/22/2015</a:t>
             </a:fld>
             <a:endParaRPr lang="en-US"/>
@@ -3227,6 +3240,7 @@
           <a:p>
             <a:fld id="{96F83EBD-BA68-4486-888E-498FC60E7D58}" type="slidenum">
               <a:rPr lang="en-US" smtClean="0"/>
+              <a:pPr/>
               <a:t>‹#›</a:t>
             </a:fld>
             <a:endParaRPr lang="en-US"/>
@@ -3781,6 +3795,7 @@
           <a:p>
             <a:fld id="{93612900-739A-42EB-8572-C4EB7D3F20C3}" type="datetimeFigureOut">
               <a:rPr lang="en-US" smtClean="0"/>
+              <a:pPr/>
               <a:t>3/22/2015</a:t>
             </a:fld>
             <a:endParaRPr lang="en-US"/>
@@ -3827,6 +3842,7 @@
           <a:p>
             <a:fld id="{96F83EBD-BA68-4486-888E-498FC60E7D58}" type="slidenum">
               <a:rPr lang="en-US" smtClean="0"/>
+              <a:pPr/>
               <a:t>‹#›</a:t>
             </a:fld>
             <a:endParaRPr lang="en-US"/>
@@ -4218,6 +4234,7 @@
           <a:p>
             <a:fld id="{93612900-739A-42EB-8572-C4EB7D3F20C3}" type="datetimeFigureOut">
               <a:rPr lang="en-US" smtClean="0"/>
+              <a:pPr/>
               <a:t>3/22/2015</a:t>
             </a:fld>
             <a:endParaRPr lang="en-US"/>
@@ -4264,6 +4281,7 @@
           <a:p>
             <a:fld id="{96F83EBD-BA68-4486-888E-498FC60E7D58}" type="slidenum">
               <a:rPr lang="en-US" smtClean="0"/>
+              <a:pPr/>
               <a:t>‹#›</a:t>
             </a:fld>
             <a:endParaRPr lang="en-US"/>
@@ -4779,6 +4797,7 @@
           <a:p>
             <a:fld id="{93612900-739A-42EB-8572-C4EB7D3F20C3}" type="datetimeFigureOut">
               <a:rPr lang="en-US" smtClean="0"/>
+              <a:pPr/>
               <a:t>3/22/2015</a:t>
             </a:fld>
             <a:endParaRPr lang="en-US"/>
@@ -4825,6 +4844,7 @@
           <a:p>
             <a:fld id="{96F83EBD-BA68-4486-888E-498FC60E7D58}" type="slidenum">
               <a:rPr lang="en-US" smtClean="0"/>
+              <a:pPr/>
               <a:t>‹#›</a:t>
             </a:fld>
             <a:endParaRPr lang="en-US"/>
@@ -4875,6 +4895,7 @@
           <a:p>
             <a:fld id="{93612900-739A-42EB-8572-C4EB7D3F20C3}" type="datetimeFigureOut">
               <a:rPr lang="en-US" smtClean="0"/>
+              <a:pPr/>
               <a:t>3/22/2015</a:t>
             </a:fld>
             <a:endParaRPr lang="en-US"/>
@@ -4921,6 +4942,7 @@
           <a:p>
             <a:fld id="{96F83EBD-BA68-4486-888E-498FC60E7D58}" type="slidenum">
               <a:rPr lang="en-US" smtClean="0"/>
+              <a:pPr/>
               <a:t>‹#›</a:t>
             </a:fld>
             <a:endParaRPr lang="en-US"/>
@@ -5129,6 +5151,7 @@
           <a:p>
             <a:fld id="{93612900-739A-42EB-8572-C4EB7D3F20C3}" type="datetimeFigureOut">
               <a:rPr lang="en-US" smtClean="0"/>
+              <a:pPr/>
               <a:t>3/22/2015</a:t>
             </a:fld>
             <a:endParaRPr lang="en-US"/>
@@ -5175,6 +5198,7 @@
           <a:p>
             <a:fld id="{96F83EBD-BA68-4486-888E-498FC60E7D58}" type="slidenum">
               <a:rPr lang="en-US" smtClean="0"/>
+              <a:pPr/>
               <a:t>‹#›</a:t>
             </a:fld>
             <a:endParaRPr lang="en-US"/>
@@ -5850,6 +5874,7 @@
           <a:p>
             <a:fld id="{93612900-739A-42EB-8572-C4EB7D3F20C3}" type="datetimeFigureOut">
               <a:rPr lang="en-US" smtClean="0"/>
+              <a:pPr/>
               <a:t>3/22/2015</a:t>
             </a:fld>
             <a:endParaRPr lang="en-US"/>
@@ -5906,6 +5931,7 @@
           <a:p>
             <a:fld id="{96F83EBD-BA68-4486-888E-498FC60E7D58}" type="slidenum">
               <a:rPr lang="en-US" smtClean="0"/>
+              <a:pPr/>
               <a:t>‹#›</a:t>
             </a:fld>
             <a:endParaRPr lang="en-US"/>
@@ -6523,6 +6549,7 @@
           <a:p>
             <a:fld id="{93612900-739A-42EB-8572-C4EB7D3F20C3}" type="datetimeFigureOut">
               <a:rPr lang="en-US" smtClean="0"/>
+              <a:pPr/>
               <a:t>3/22/2015</a:t>
             </a:fld>
             <a:endParaRPr lang="en-US"/>
@@ -6599,6 +6626,7 @@
           <a:p>
             <a:fld id="{96F83EBD-BA68-4486-888E-498FC60E7D58}" type="slidenum">
               <a:rPr lang="en-US" smtClean="0"/>
+              <a:pPr/>
               <a:t>‹#›</a:t>
             </a:fld>
             <a:endParaRPr lang="en-US"/>
@@ -7016,10 +7044,33 @@
             <p:ph type="title"/>
           </p:nvPr>
         </p:nvSpPr>
+        <p:spPr/>
+        <p:txBody>
+          <a:bodyPr/>
+          <a:lstStyle/>
+          <a:p>
+            <a:r>
+              <a:rPr lang="en-US" dirty="0" smtClean="0"/>
+              <a:t>Keys: Pull Up/Down Resistors</a:t>
+            </a:r>
+            <a:endParaRPr lang="en-US" dirty="0"/>
+          </a:p>
+        </p:txBody>
+      </p:sp>
+      <p:sp>
+        <p:nvSpPr>
+          <p:cNvPr id="3" name="Content Placeholder 2"/>
+          <p:cNvSpPr>
+            <a:spLocks noGrp="1"/>
+          </p:cNvSpPr>
+          <p:nvPr>
+            <p:ph idx="1"/>
+          </p:nvPr>
+        </p:nvSpPr>
         <p:spPr>
           <a:xfrm>
-            <a:off x="685800" y="512064"/>
-            <a:ext cx="8305800" cy="914400"/>
+            <a:off x="419100" y="1676400"/>
+            <a:ext cx="5921960" cy="4581624"/>
           </a:xfrm>
         </p:spPr>
         <p:txBody>
@@ -7028,53 +7079,104 @@
           <a:p>
             <a:r>
               <a:rPr lang="en-US" dirty="0" smtClean="0"/>
-              <a:t>Internal vs External Resistors</a:t>
-            </a:r>
+              <a:t>No pull up/down = floating values</a:t>
+            </a:r>
+          </a:p>
+          <a:p>
+            <a:r>
+              <a:rPr lang="en-US" dirty="0" smtClean="0"/>
+              <a:t>Floating values cause false triggers in the switch</a:t>
+            </a:r>
+          </a:p>
+          <a:p>
+            <a:endParaRPr lang="en-US" dirty="0" smtClean="0"/>
+          </a:p>
+          <a:p>
             <a:endParaRPr lang="en-US" dirty="0"/>
           </a:p>
-        </p:txBody>
-      </p:sp>
-      <p:sp>
-        <p:nvSpPr>
-          <p:cNvPr id="3" name="Content Placeholder 2"/>
-          <p:cNvSpPr>
-            <a:spLocks noGrp="1"/>
-          </p:cNvSpPr>
-          <p:nvPr>
-            <p:ph idx="1"/>
-          </p:nvPr>
-        </p:nvSpPr>
+          <a:p>
+            <a:r>
+              <a:rPr lang="en-US" dirty="0" smtClean="0"/>
+              <a:t>By adding a resistor to ground or VCC we can always keep a defined state of HIGH or LOW, preventing false triggers</a:t>
+            </a:r>
+          </a:p>
+          <a:p>
+            <a:endParaRPr lang="en-US" dirty="0"/>
+          </a:p>
+          <a:p>
+            <a:endParaRPr lang="en-US" dirty="0"/>
+          </a:p>
+        </p:txBody>
+      </p:sp>
+      <p:pic>
+        <p:nvPicPr>
+          <p:cNvPr id="1028" name="Picture 4" descr="http://images.elektroda.net/37_1290066934.png"/>
+          <p:cNvPicPr>
+            <a:picLocks noChangeAspect="1" noChangeArrowheads="1"/>
+          </p:cNvPicPr>
+          <p:nvPr/>
+        </p:nvPicPr>
+        <p:blipFill>
+          <a:blip r:embed="rId3" cstate="print">
+            <a:extLst>
+              <a:ext uri="{28A0092B-C50C-407E-A947-70E740481C1C}">
+                <a14:useLocalDpi xmlns:a14="http://schemas.microsoft.com/office/drawing/2010/main" xmlns="" val="0"/>
+              </a:ext>
+            </a:extLst>
+          </a:blip>
+          <a:srcRect/>
+          <a:stretch>
+            <a:fillRect/>
+          </a:stretch>
+        </p:blipFill>
+        <p:spPr bwMode="auto">
+          <a:xfrm>
+            <a:off x="6341060" y="3505200"/>
+            <a:ext cx="2672179" cy="3231360"/>
+          </a:xfrm>
+          <a:prstGeom prst="rect">
+            <a:avLst/>
+          </a:prstGeom>
+          <a:noFill/>
+          <a:extLst>
+            <a:ext uri="{909E8E84-426E-40DD-AFC4-6F175D3DCCD1}">
+              <a14:hiddenFill xmlns:a14="http://schemas.microsoft.com/office/drawing/2010/main" xmlns="">
+                <a:solidFill>
+                  <a:srgbClr val="FFFFFF"/>
+                </a:solidFill>
+              </a14:hiddenFill>
+            </a:ext>
+          </a:extLst>
+        </p:spPr>
+      </p:pic>
+      <p:pic>
+        <p:nvPicPr>
+          <p:cNvPr id="4" name="Picture 3"/>
+          <p:cNvPicPr>
+            <a:picLocks noChangeAspect="1"/>
+          </p:cNvPicPr>
+          <p:nvPr/>
+        </p:nvPicPr>
+        <p:blipFill>
+          <a:blip r:embed="rId4" cstate="print"/>
+          <a:stretch>
+            <a:fillRect/>
+          </a:stretch>
+        </p:blipFill>
         <p:spPr>
           <a:xfrm>
-            <a:off x="685800" y="1828800"/>
-            <a:ext cx="8229600" cy="4572000"/>
-          </a:xfrm>
-        </p:spPr>
-        <p:txBody>
-          <a:bodyPr/>
-          <a:lstStyle/>
-          <a:p>
-            <a:r>
-              <a:rPr lang="en-US" dirty="0" smtClean="0"/>
-              <a:t>External pull up/down resistors can be used to simplify programming.</a:t>
-            </a:r>
-          </a:p>
-          <a:p>
-            <a:endParaRPr lang="en-US" dirty="0"/>
-          </a:p>
-          <a:p>
-            <a:r>
-              <a:rPr lang="en-US" dirty="0" smtClean="0"/>
-              <a:t>Internal pull up/down resistors can lower cost, simplifies circuitry, and is convenient when parts are not readily available.</a:t>
-            </a:r>
-            <a:endParaRPr lang="en-US" dirty="0"/>
-          </a:p>
-        </p:txBody>
-      </p:sp>
+            <a:off x="6384339" y="1219200"/>
+            <a:ext cx="2628900" cy="2168843"/>
+          </a:xfrm>
+          <a:prstGeom prst="rect">
+            <a:avLst/>
+          </a:prstGeom>
+        </p:spPr>
+      </p:pic>
     </p:spTree>
     <p:extLst>
       <p:ext uri="{BB962C8B-B14F-4D97-AF65-F5344CB8AC3E}">
-        <p14:creationId xmlns:p14="http://schemas.microsoft.com/office/powerpoint/2010/main" val="591446997"/>
+        <p14:creationId xmlns:p14="http://schemas.microsoft.com/office/powerpoint/2010/main" xmlns="" val="1652423782"/>
       </p:ext>
     </p:extLst>
   </p:cSld>
@@ -7113,8 +7215,8 @@
         </p:nvSpPr>
         <p:spPr>
           <a:xfrm>
-            <a:off x="914400" y="512064"/>
-            <a:ext cx="7924800" cy="914400"/>
+            <a:off x="685800" y="512064"/>
+            <a:ext cx="8305800" cy="914400"/>
           </a:xfrm>
         </p:spPr>
         <p:txBody>
@@ -7122,10 +7224,10 @@
           <a:lstStyle/>
           <a:p>
             <a:r>
-              <a:rPr lang="en-US" sz="3600" dirty="0" smtClean="0"/>
-              <a:t>Real Time/Gadfly Synchronization</a:t>
-            </a:r>
-            <a:endParaRPr lang="en-US" sz="3600" dirty="0"/>
+              <a:rPr lang="en-US" dirty="0" smtClean="0"/>
+              <a:t>Internal vs External Resistors</a:t>
+            </a:r>
+            <a:endParaRPr lang="en-US" dirty="0"/>
           </a:p>
         </p:txBody>
       </p:sp>
@@ -7141,8 +7243,8 @@
         </p:nvSpPr>
         <p:spPr>
           <a:xfrm>
-            <a:off x="914400" y="1426464"/>
-            <a:ext cx="7772400" cy="2788440"/>
+            <a:off x="685800" y="1828800"/>
+            <a:ext cx="8229600" cy="4572000"/>
           </a:xfrm>
         </p:spPr>
         <p:txBody>
@@ -7151,52 +7253,25 @@
           <a:p>
             <a:r>
               <a:rPr lang="en-US" dirty="0" smtClean="0"/>
-              <a:t>The program continually “asks” the status of the switch, also called polling</a:t>
-            </a:r>
-          </a:p>
-          <a:p>
-            <a:pPr marL="68580" indent="0">
-              <a:buNone/>
-            </a:pPr>
-            <a:endParaRPr lang="en-US" dirty="0" smtClean="0"/>
+              <a:t>External pull up/down resistors can be used to simplify programming.</a:t>
+            </a:r>
+          </a:p>
+          <a:p>
+            <a:endParaRPr lang="en-US" dirty="0"/>
           </a:p>
           <a:p>
             <a:r>
               <a:rPr lang="en-US" dirty="0" smtClean="0"/>
-              <a:t>Even when the switch is not pressed the program is checking the status</a:t>
+              <a:t>Internal pull up/down resistors can lower cost, simplifies circuitry, and is convenient when parts are not readily available.</a:t>
             </a:r>
             <a:endParaRPr lang="en-US" dirty="0"/>
           </a:p>
         </p:txBody>
       </p:sp>
-      <p:pic>
-        <p:nvPicPr>
-          <p:cNvPr id="4" name="Picture 3"/>
-          <p:cNvPicPr>
-            <a:picLocks noChangeAspect="1"/>
-          </p:cNvPicPr>
-          <p:nvPr/>
-        </p:nvPicPr>
-        <p:blipFill>
-          <a:blip r:embed="rId2"/>
-          <a:stretch>
-            <a:fillRect/>
-          </a:stretch>
-        </p:blipFill>
-        <p:spPr>
-          <a:xfrm>
-            <a:off x="3276600" y="4114800"/>
-            <a:ext cx="3124200" cy="2614674"/>
-          </a:xfrm>
-          <a:prstGeom prst="rect">
-            <a:avLst/>
-          </a:prstGeom>
-        </p:spPr>
-      </p:pic>
     </p:spTree>
     <p:extLst>
       <p:ext uri="{BB962C8B-B14F-4D97-AF65-F5344CB8AC3E}">
-        <p14:creationId xmlns:p14="http://schemas.microsoft.com/office/powerpoint/2010/main" val="3308376188"/>
+        <p14:creationId xmlns:p14="http://schemas.microsoft.com/office/powerpoint/2010/main" xmlns="" val="591446997"/>
       </p:ext>
     </p:extLst>
   </p:cSld>
@@ -7235,8 +7310,8 @@
         </p:nvSpPr>
         <p:spPr>
           <a:xfrm>
-            <a:off x="935736" y="152400"/>
-            <a:ext cx="7772400" cy="914400"/>
+            <a:off x="914400" y="512064"/>
+            <a:ext cx="7924800" cy="914400"/>
           </a:xfrm>
         </p:spPr>
         <p:txBody>
@@ -7244,10 +7319,10 @@
           <a:lstStyle/>
           <a:p>
             <a:r>
-              <a:rPr lang="en-US" dirty="0" smtClean="0"/>
-              <a:t>Interrupt Synchronization</a:t>
-            </a:r>
-            <a:endParaRPr lang="en-US" dirty="0"/>
+              <a:rPr lang="en-US" sz="3600" dirty="0" smtClean="0"/>
+              <a:t>Real Time/Gadfly Synchronization</a:t>
+            </a:r>
+            <a:endParaRPr lang="en-US" sz="3600" dirty="0"/>
           </a:p>
         </p:txBody>
       </p:sp>
@@ -7263,90 +7338,62 @@
         </p:nvSpPr>
         <p:spPr>
           <a:xfrm>
-            <a:off x="935736" y="1039368"/>
-            <a:ext cx="7772400" cy="4572000"/>
-          </a:xfrm>
-        </p:spPr>
-        <p:txBody>
-          <a:bodyPr>
-            <a:normAutofit/>
-          </a:bodyPr>
+            <a:off x="914400" y="1426464"/>
+            <a:ext cx="7772400" cy="2788440"/>
+          </a:xfrm>
+        </p:spPr>
+        <p:txBody>
+          <a:bodyPr/>
           <a:lstStyle/>
           <a:p>
             <a:r>
-              <a:rPr lang="en-US" sz="2800" dirty="0" smtClean="0"/>
-              <a:t>The program runs other functions until the switch is pressed.</a:t>
-            </a:r>
-            <a:endParaRPr lang="en-US" sz="2800" dirty="0"/>
-          </a:p>
-          <a:p>
-            <a:r>
-              <a:rPr lang="en-US" sz="2800" dirty="0" smtClean="0"/>
-              <a:t>When the switch is pressed, it interrupts the program and runs it’s function. </a:t>
-            </a:r>
-          </a:p>
-          <a:p>
-            <a:endParaRPr lang="en-US" sz="2800" dirty="0"/>
-          </a:p>
-          <a:p>
-            <a:r>
-              <a:rPr lang="en-US" sz="2800" dirty="0" smtClean="0"/>
-              <a:t>Only certain pins can be interrupts.  Lecture 5 shows detailed steps how to work around this.</a:t>
+              <a:rPr lang="en-US" dirty="0" smtClean="0"/>
+              <a:t>The program continually “asks” the status of the switch, also called polling</a:t>
             </a:r>
           </a:p>
           <a:p>
             <a:pPr marL="68580" indent="0">
               <a:buNone/>
             </a:pPr>
+            <a:endParaRPr lang="en-US" dirty="0" smtClean="0"/>
+          </a:p>
+          <a:p>
+            <a:r>
+              <a:rPr lang="en-US" dirty="0" smtClean="0"/>
+              <a:t>Even when the switch is not pressed the program is checking the status</a:t>
+            </a:r>
             <a:endParaRPr lang="en-US" dirty="0"/>
           </a:p>
         </p:txBody>
       </p:sp>
       <p:pic>
         <p:nvPicPr>
-          <p:cNvPr id="2050" name="Picture 2" descr="http://www.pyroelectro.com/tutorials/pic_interrupts_vs_polling/img/int.png"/>
+          <p:cNvPr id="4" name="Picture 3"/>
           <p:cNvPicPr>
-            <a:picLocks noChangeAspect="1" noChangeArrowheads="1"/>
+            <a:picLocks noChangeAspect="1"/>
           </p:cNvPicPr>
           <p:nvPr/>
         </p:nvPicPr>
         <p:blipFill>
-          <a:blip r:embed="rId2">
-            <a:extLst>
-              <a:ext uri="{28A0092B-C50C-407E-A947-70E740481C1C}">
-                <a14:useLocalDpi xmlns:a14="http://schemas.microsoft.com/office/drawing/2010/main" val="0"/>
-              </a:ext>
-            </a:extLst>
-          </a:blip>
-          <a:srcRect/>
+          <a:blip r:embed="rId2" cstate="print"/>
           <a:stretch>
             <a:fillRect/>
           </a:stretch>
         </p:blipFill>
-        <p:spPr bwMode="auto">
+        <p:spPr>
           <a:xfrm>
-            <a:off x="3200400" y="4419599"/>
-            <a:ext cx="3048000" cy="2386989"/>
+            <a:off x="3276600" y="4114800"/>
+            <a:ext cx="3124200" cy="2614674"/>
           </a:xfrm>
           <a:prstGeom prst="rect">
             <a:avLst/>
           </a:prstGeom>
-          <a:noFill/>
-          <a:extLst>
-            <a:ext uri="{909E8E84-426E-40DD-AFC4-6F175D3DCCD1}">
-              <a14:hiddenFill xmlns:a14="http://schemas.microsoft.com/office/drawing/2010/main">
-                <a:solidFill>
-                  <a:srgbClr val="FFFFFF"/>
-                </a:solidFill>
-              </a14:hiddenFill>
-            </a:ext>
-          </a:extLst>
         </p:spPr>
       </p:pic>
     </p:spTree>
     <p:extLst>
       <p:ext uri="{BB962C8B-B14F-4D97-AF65-F5344CB8AC3E}">
-        <p14:creationId xmlns:p14="http://schemas.microsoft.com/office/powerpoint/2010/main" val="3383491756"/>
+        <p14:creationId xmlns:p14="http://schemas.microsoft.com/office/powerpoint/2010/main" xmlns="" val="3308376188"/>
       </p:ext>
     </p:extLst>
   </p:cSld>
@@ -7383,14 +7430,19 @@
             <p:ph type="title"/>
           </p:nvPr>
         </p:nvSpPr>
-        <p:spPr/>
+        <p:spPr>
+          <a:xfrm>
+            <a:off x="935736" y="152400"/>
+            <a:ext cx="7772400" cy="914400"/>
+          </a:xfrm>
+        </p:spPr>
         <p:txBody>
           <a:bodyPr/>
           <a:lstStyle/>
           <a:p>
             <a:r>
               <a:rPr lang="en-US" dirty="0" smtClean="0"/>
-              <a:t>Lab Questions</a:t>
+              <a:t>Interrupt Synchronization</a:t>
             </a:r>
             <a:endParaRPr lang="en-US" dirty="0"/>
           </a:p>
@@ -7408,153 +7460,35 @@
         </p:nvSpPr>
         <p:spPr>
           <a:xfrm>
-            <a:off x="457200" y="1426464"/>
-            <a:ext cx="8534400" cy="5202936"/>
+            <a:off x="935736" y="1039368"/>
+            <a:ext cx="7772400" cy="4572000"/>
           </a:xfrm>
         </p:spPr>
         <p:txBody>
           <a:bodyPr>
-            <a:normAutofit lnSpcReduction="10000"/>
+            <a:normAutofit/>
           </a:bodyPr>
           <a:lstStyle/>
           <a:p>
-            <a:pPr marL="68580" indent="0">
-              <a:buNone/>
-            </a:pPr>
             <a:r>
               <a:rPr lang="en-US" sz="2800" dirty="0" smtClean="0"/>
-              <a:t>Q: </a:t>
-            </a:r>
-            <a:r>
-              <a:rPr lang="en-US" sz="2800" dirty="0"/>
-              <a:t>Do you need to use internal pull-ups for the keys on the joystick shield</a:t>
-            </a:r>
+              <a:t>The program runs other functions until the switch is pressed.</a:t>
+            </a:r>
+            <a:endParaRPr lang="en-US" sz="2800" dirty="0"/>
+          </a:p>
+          <a:p>
             <a:r>
               <a:rPr lang="en-US" sz="2800" dirty="0" smtClean="0"/>
-              <a:t>?</a:t>
-            </a:r>
-          </a:p>
-          <a:p>
-            <a:pPr marL="68580" indent="0">
-              <a:buNone/>
-            </a:pPr>
+              <a:t>When the switch is pressed, it interrupts the program and runs it’s function. </a:t>
+            </a:r>
+          </a:p>
+          <a:p>
+            <a:endParaRPr lang="en-US" sz="2800" dirty="0"/>
+          </a:p>
+          <a:p>
             <a:r>
               <a:rPr lang="en-US" sz="2800" dirty="0" smtClean="0"/>
-              <a:t>A:</a:t>
-            </a:r>
-          </a:p>
-          <a:p>
-            <a:pPr marL="68580" indent="0">
-              <a:buNone/>
-            </a:pPr>
-            <a:endParaRPr lang="en-US" sz="2800" dirty="0"/>
-          </a:p>
-          <a:p>
-            <a:pPr marL="68580" indent="0">
-              <a:buNone/>
-            </a:pPr>
-            <a:r>
-              <a:rPr lang="en-US" sz="2800" dirty="0"/>
-              <a:t>Q:How would your code look like for switches which are connected to pull-down resistors instead of pull-up resistors?</a:t>
-            </a:r>
-          </a:p>
-          <a:p>
-            <a:pPr marL="68580" indent="0">
-              <a:buNone/>
-            </a:pPr>
-            <a:r>
-              <a:rPr lang="en-US" sz="2800" dirty="0" smtClean="0"/>
-              <a:t>A</a:t>
-            </a:r>
-            <a:r>
-              <a:rPr lang="en-US" sz="2800" dirty="0"/>
-              <a:t>:  PTAD = </a:t>
-            </a:r>
-            <a:r>
-              <a:rPr lang="en-US" sz="4000" dirty="0" smtClean="0"/>
-              <a:t>0</a:t>
-            </a:r>
-            <a:r>
-              <a:rPr lang="en-US" sz="2800" dirty="0" smtClean="0"/>
-              <a:t>xFF</a:t>
-            </a:r>
-            <a:r>
-              <a:rPr lang="en-US" sz="2800" dirty="0"/>
-              <a:t>; </a:t>
-            </a:r>
-            <a:r>
-              <a:rPr lang="en-US" sz="2800" dirty="0" smtClean="0"/>
-              <a:t>/// </a:t>
-            </a:r>
-            <a:r>
-              <a:rPr lang="en-US" sz="2800" dirty="0"/>
-              <a:t>write 1‘s to prevent false </a:t>
-            </a:r>
-            <a:r>
-              <a:rPr lang="en-US" sz="2800" dirty="0" smtClean="0"/>
-              <a:t>interrupts</a:t>
-            </a:r>
-          </a:p>
-          <a:p>
-            <a:pPr marL="68580" indent="0">
-              <a:buNone/>
-            </a:pPr>
-            <a:r>
-              <a:rPr lang="en-US" sz="2800" dirty="0"/>
-              <a:t>	 </a:t>
-            </a:r>
-            <a:r>
-              <a:rPr lang="en-US" sz="2800" dirty="0" smtClean="0"/>
-              <a:t>       to set as pull-down instead of pull-up</a:t>
-            </a:r>
-          </a:p>
-          <a:p>
-            <a:pPr marL="68580" indent="0">
-              <a:buNone/>
-            </a:pPr>
-            <a:r>
-              <a:rPr lang="en-US" sz="2800" dirty="0" smtClean="0"/>
-              <a:t>      </a:t>
-            </a:r>
-            <a:r>
-              <a:rPr lang="en-US" sz="2800" dirty="0"/>
-              <a:t>PTAD = </a:t>
-            </a:r>
-            <a:r>
-              <a:rPr lang="en-US" sz="4000" dirty="0" smtClean="0"/>
-              <a:t>0</a:t>
-            </a:r>
-            <a:r>
-              <a:rPr lang="en-US" sz="2800" dirty="0" smtClean="0"/>
-              <a:t>x</a:t>
-            </a:r>
-            <a:r>
-              <a:rPr lang="en-US" sz="4000" dirty="0" smtClean="0"/>
-              <a:t>00</a:t>
-            </a:r>
-            <a:r>
-              <a:rPr lang="en-US" sz="2800" dirty="0" smtClean="0"/>
-              <a:t>; </a:t>
-            </a:r>
-            <a:r>
-              <a:rPr lang="en-US" sz="2800" dirty="0"/>
-              <a:t>/// write </a:t>
-            </a:r>
-            <a:r>
-              <a:rPr lang="en-US" sz="3600" dirty="0" smtClean="0"/>
-              <a:t>0</a:t>
-            </a:r>
-            <a:r>
-              <a:rPr lang="en-US" sz="2800" dirty="0" smtClean="0"/>
-              <a:t>‘s </a:t>
-            </a:r>
-            <a:r>
-              <a:rPr lang="en-US" sz="2800" dirty="0"/>
-              <a:t>to prevent false </a:t>
-            </a:r>
-            <a:r>
-              <a:rPr lang="en-US" sz="2800" dirty="0" smtClean="0"/>
-              <a:t>interrupts </a:t>
+              <a:t>Only certain pins can be interrupts.  Lecture 5 shows detailed steps how to work around this.</a:t>
             </a:r>
           </a:p>
           <a:p>
@@ -7563,93 +7497,53 @@
             </a:pPr>
             <a:endParaRPr lang="en-US" dirty="0"/>
           </a:p>
-          <a:p>
-            <a:pPr marL="68580" indent="0">
-              <a:buNone/>
-            </a:pPr>
-            <a:endParaRPr lang="en-US" dirty="0"/>
-          </a:p>
-          <a:p>
-            <a:endParaRPr lang="en-US" dirty="0"/>
-          </a:p>
-        </p:txBody>
-      </p:sp>
-      <p:cxnSp>
-        <p:nvCxnSpPr>
-          <p:cNvPr id="5" name="Straight Arrow Connector 4"/>
-          <p:cNvCxnSpPr/>
+        </p:txBody>
+      </p:sp>
+      <p:pic>
+        <p:nvPicPr>
+          <p:cNvPr id="2050" name="Picture 2" descr="http://www.pyroelectro.com/tutorials/pic_interrupts_vs_polling/img/int.png"/>
+          <p:cNvPicPr>
+            <a:picLocks noChangeAspect="1" noChangeArrowheads="1"/>
+          </p:cNvPicPr>
           <p:nvPr/>
-        </p:nvCxnSpPr>
-        <p:spPr>
+        </p:nvPicPr>
+        <p:blipFill>
+          <a:blip r:embed="rId2" cstate="print">
+            <a:extLst>
+              <a:ext uri="{28A0092B-C50C-407E-A947-70E740481C1C}">
+                <a14:useLocalDpi xmlns:a14="http://schemas.microsoft.com/office/drawing/2010/main" xmlns="" val="0"/>
+              </a:ext>
+            </a:extLst>
+          </a:blip>
+          <a:srcRect/>
+          <a:stretch>
+            <a:fillRect/>
+          </a:stretch>
+        </p:blipFill>
+        <p:spPr bwMode="auto">
           <a:xfrm>
-            <a:off x="1828800" y="5105400"/>
-            <a:ext cx="0" cy="457200"/>
-          </a:xfrm>
-          <a:prstGeom prst="straightConnector1">
+            <a:off x="3200400" y="4419599"/>
+            <a:ext cx="3048000" cy="2386989"/>
+          </a:xfrm>
+          <a:prstGeom prst="rect">
             <a:avLst/>
           </a:prstGeom>
-          <a:ln w="28575">
-            <a:solidFill>
-              <a:schemeClr val="tx1"/>
-            </a:solidFill>
-            <a:tailEnd type="triangle"/>
-          </a:ln>
-        </p:spPr>
-        <p:style>
-          <a:lnRef idx="1">
-            <a:schemeClr val="accent1"/>
-          </a:lnRef>
-          <a:fillRef idx="0">
-            <a:schemeClr val="accent1"/>
-          </a:fillRef>
-          <a:effectRef idx="0">
-            <a:schemeClr val="accent1"/>
-          </a:effectRef>
-          <a:fontRef idx="minor">
-            <a:schemeClr val="tx1"/>
-          </a:fontRef>
-        </p:style>
-      </p:cxnSp>
-      <p:cxnSp>
-        <p:nvCxnSpPr>
-          <p:cNvPr id="6" name="Straight Arrow Connector 5"/>
-          <p:cNvCxnSpPr/>
-          <p:nvPr/>
-        </p:nvCxnSpPr>
-        <p:spPr>
-          <a:xfrm>
-            <a:off x="7543800" y="5105400"/>
-            <a:ext cx="0" cy="457200"/>
-          </a:xfrm>
-          <a:prstGeom prst="straightConnector1">
-            <a:avLst/>
-          </a:prstGeom>
-          <a:ln w="28575">
-            <a:solidFill>
-              <a:schemeClr val="tx1"/>
-            </a:solidFill>
-            <a:tailEnd type="triangle"/>
-          </a:ln>
-        </p:spPr>
-        <p:style>
-          <a:lnRef idx="1">
-            <a:schemeClr val="accent1"/>
-          </a:lnRef>
-          <a:fillRef idx="0">
-            <a:schemeClr val="accent1"/>
-          </a:fillRef>
-          <a:effectRef idx="0">
-            <a:schemeClr val="accent1"/>
-          </a:effectRef>
-          <a:fontRef idx="minor">
-            <a:schemeClr val="tx1"/>
-          </a:fontRef>
-        </p:style>
-      </p:cxnSp>
+          <a:noFill/>
+          <a:extLst>
+            <a:ext uri="{909E8E84-426E-40DD-AFC4-6F175D3DCCD1}">
+              <a14:hiddenFill xmlns:a14="http://schemas.microsoft.com/office/drawing/2010/main" xmlns="">
+                <a:solidFill>
+                  <a:srgbClr val="FFFFFF"/>
+                </a:solidFill>
+              </a14:hiddenFill>
+            </a:ext>
+          </a:extLst>
+        </p:spPr>
+      </p:pic>
     </p:spTree>
     <p:extLst>
       <p:ext uri="{BB962C8B-B14F-4D97-AF65-F5344CB8AC3E}">
-        <p14:creationId xmlns:p14="http://schemas.microsoft.com/office/powerpoint/2010/main" val="3136318115"/>
+        <p14:creationId xmlns:p14="http://schemas.microsoft.com/office/powerpoint/2010/main" xmlns="" val="3383491756"/>
       </p:ext>
     </p:extLst>
   </p:cSld>
@@ -7693,6 +7587,309 @@
           <a:p>
             <a:r>
               <a:rPr lang="en-US" dirty="0" smtClean="0"/>
+              <a:t>Lab Questions</a:t>
+            </a:r>
+            <a:endParaRPr lang="en-US" dirty="0"/>
+          </a:p>
+        </p:txBody>
+      </p:sp>
+      <p:sp>
+        <p:nvSpPr>
+          <p:cNvPr id="3" name="Content Placeholder 2"/>
+          <p:cNvSpPr>
+            <a:spLocks noGrp="1"/>
+          </p:cNvSpPr>
+          <p:nvPr>
+            <p:ph idx="1"/>
+          </p:nvPr>
+        </p:nvSpPr>
+        <p:spPr>
+          <a:xfrm>
+            <a:off x="457200" y="1426464"/>
+            <a:ext cx="8534400" cy="5202936"/>
+          </a:xfrm>
+        </p:spPr>
+        <p:txBody>
+          <a:bodyPr>
+            <a:normAutofit lnSpcReduction="10000"/>
+          </a:bodyPr>
+          <a:lstStyle/>
+          <a:p>
+            <a:pPr marL="68580" indent="0">
+              <a:buNone/>
+            </a:pPr>
+            <a:r>
+              <a:rPr lang="en-US" sz="2800" dirty="0" smtClean="0"/>
+              <a:t>Q: </a:t>
+            </a:r>
+            <a:r>
+              <a:rPr lang="en-US" sz="2800" dirty="0"/>
+              <a:t>Do you need to use internal pull-ups for the keys on the joystick shield</a:t>
+            </a:r>
+            <a:r>
+              <a:rPr lang="en-US" sz="2800" dirty="0" smtClean="0"/>
+              <a:t>?</a:t>
+            </a:r>
+          </a:p>
+          <a:p>
+            <a:pPr marL="68580" indent="0">
+              <a:buNone/>
+            </a:pPr>
+            <a:r>
+              <a:rPr lang="en-US" sz="2800" dirty="0" smtClean="0"/>
+              <a:t>A:</a:t>
+            </a:r>
+          </a:p>
+          <a:p>
+            <a:pPr marL="68580" indent="0">
+              <a:buNone/>
+            </a:pPr>
+            <a:endParaRPr lang="en-US" sz="2800" dirty="0"/>
+          </a:p>
+          <a:p>
+            <a:pPr marL="68580" indent="0">
+              <a:buNone/>
+            </a:pPr>
+            <a:r>
+              <a:rPr lang="en-US" sz="2800" dirty="0"/>
+              <a:t>Q:How would your code look like for switches which are connected to pull-down resistors instead of pull-up resistors?</a:t>
+            </a:r>
+          </a:p>
+          <a:p>
+            <a:pPr marL="68580" indent="0">
+              <a:buNone/>
+            </a:pPr>
+            <a:r>
+              <a:rPr lang="en-US" sz="2800" dirty="0" smtClean="0"/>
+              <a:t>A</a:t>
+            </a:r>
+            <a:r>
+              <a:rPr lang="en-US" sz="2800" dirty="0"/>
+              <a:t>:  PTAD = </a:t>
+            </a:r>
+            <a:r>
+              <a:rPr lang="en-US" sz="4000" dirty="0" smtClean="0"/>
+              <a:t>0</a:t>
+            </a:r>
+            <a:r>
+              <a:rPr lang="en-US" sz="2800" dirty="0" smtClean="0"/>
+              <a:t>xFF</a:t>
+            </a:r>
+            <a:r>
+              <a:rPr lang="en-US" sz="2800" dirty="0"/>
+              <a:t>; </a:t>
+            </a:r>
+            <a:r>
+              <a:rPr lang="en-US" sz="2800" dirty="0" smtClean="0"/>
+              <a:t>/// </a:t>
+            </a:r>
+            <a:r>
+              <a:rPr lang="en-US" sz="2800" dirty="0"/>
+              <a:t>write 1‘s to prevent false </a:t>
+            </a:r>
+            <a:r>
+              <a:rPr lang="en-US" sz="2800" dirty="0" smtClean="0"/>
+              <a:t>interrupts</a:t>
+            </a:r>
+          </a:p>
+          <a:p>
+            <a:pPr marL="68580" indent="0">
+              <a:buNone/>
+            </a:pPr>
+            <a:r>
+              <a:rPr lang="en-US" sz="2800" dirty="0"/>
+              <a:t>	 </a:t>
+            </a:r>
+            <a:r>
+              <a:rPr lang="en-US" sz="2800" dirty="0" smtClean="0"/>
+              <a:t>       to set as pull-down instead of pull-up</a:t>
+            </a:r>
+          </a:p>
+          <a:p>
+            <a:pPr marL="68580" indent="0">
+              <a:buNone/>
+            </a:pPr>
+            <a:r>
+              <a:rPr lang="en-US" sz="2800" dirty="0" smtClean="0"/>
+              <a:t>      </a:t>
+            </a:r>
+            <a:r>
+              <a:rPr lang="en-US" sz="2800" dirty="0"/>
+              <a:t>PTAD = </a:t>
+            </a:r>
+            <a:r>
+              <a:rPr lang="en-US" sz="4000" dirty="0" smtClean="0"/>
+              <a:t>0</a:t>
+            </a:r>
+            <a:r>
+              <a:rPr lang="en-US" sz="2800" dirty="0" smtClean="0"/>
+              <a:t>x</a:t>
+            </a:r>
+            <a:r>
+              <a:rPr lang="en-US" sz="4000" dirty="0" smtClean="0"/>
+              <a:t>00</a:t>
+            </a:r>
+            <a:r>
+              <a:rPr lang="en-US" sz="2800" dirty="0" smtClean="0"/>
+              <a:t>; </a:t>
+            </a:r>
+            <a:r>
+              <a:rPr lang="en-US" sz="2800" dirty="0"/>
+              <a:t>/// write </a:t>
+            </a:r>
+            <a:r>
+              <a:rPr lang="en-US" sz="3600" dirty="0" smtClean="0"/>
+              <a:t>0</a:t>
+            </a:r>
+            <a:r>
+              <a:rPr lang="en-US" sz="2800" dirty="0" smtClean="0"/>
+              <a:t>‘s </a:t>
+            </a:r>
+            <a:r>
+              <a:rPr lang="en-US" sz="2800" dirty="0"/>
+              <a:t>to prevent false </a:t>
+            </a:r>
+            <a:r>
+              <a:rPr lang="en-US" sz="2800" dirty="0" smtClean="0"/>
+              <a:t>interrupts </a:t>
+            </a:r>
+          </a:p>
+          <a:p>
+            <a:pPr marL="68580" indent="0">
+              <a:buNone/>
+            </a:pPr>
+            <a:endParaRPr lang="en-US" dirty="0"/>
+          </a:p>
+          <a:p>
+            <a:pPr marL="68580" indent="0">
+              <a:buNone/>
+            </a:pPr>
+            <a:endParaRPr lang="en-US" dirty="0"/>
+          </a:p>
+          <a:p>
+            <a:endParaRPr lang="en-US" dirty="0"/>
+          </a:p>
+        </p:txBody>
+      </p:sp>
+      <p:cxnSp>
+        <p:nvCxnSpPr>
+          <p:cNvPr id="5" name="Straight Arrow Connector 4"/>
+          <p:cNvCxnSpPr/>
+          <p:nvPr/>
+        </p:nvCxnSpPr>
+        <p:spPr>
+          <a:xfrm>
+            <a:off x="1828800" y="5105400"/>
+            <a:ext cx="0" cy="457200"/>
+          </a:xfrm>
+          <a:prstGeom prst="straightConnector1">
+            <a:avLst/>
+          </a:prstGeom>
+          <a:ln w="28575">
+            <a:solidFill>
+              <a:schemeClr val="tx1"/>
+            </a:solidFill>
+            <a:tailEnd type="triangle"/>
+          </a:ln>
+        </p:spPr>
+        <p:style>
+          <a:lnRef idx="1">
+            <a:schemeClr val="accent1"/>
+          </a:lnRef>
+          <a:fillRef idx="0">
+            <a:schemeClr val="accent1"/>
+          </a:fillRef>
+          <a:effectRef idx="0">
+            <a:schemeClr val="accent1"/>
+          </a:effectRef>
+          <a:fontRef idx="minor">
+            <a:schemeClr val="tx1"/>
+          </a:fontRef>
+        </p:style>
+      </p:cxnSp>
+      <p:cxnSp>
+        <p:nvCxnSpPr>
+          <p:cNvPr id="6" name="Straight Arrow Connector 5"/>
+          <p:cNvCxnSpPr/>
+          <p:nvPr/>
+        </p:nvCxnSpPr>
+        <p:spPr>
+          <a:xfrm>
+            <a:off x="7543800" y="5105400"/>
+            <a:ext cx="0" cy="457200"/>
+          </a:xfrm>
+          <a:prstGeom prst="straightConnector1">
+            <a:avLst/>
+          </a:prstGeom>
+          <a:ln w="28575">
+            <a:solidFill>
+              <a:schemeClr val="tx1"/>
+            </a:solidFill>
+            <a:tailEnd type="triangle"/>
+          </a:ln>
+        </p:spPr>
+        <p:style>
+          <a:lnRef idx="1">
+            <a:schemeClr val="accent1"/>
+          </a:lnRef>
+          <a:fillRef idx="0">
+            <a:schemeClr val="accent1"/>
+          </a:fillRef>
+          <a:effectRef idx="0">
+            <a:schemeClr val="accent1"/>
+          </a:effectRef>
+          <a:fontRef idx="minor">
+            <a:schemeClr val="tx1"/>
+          </a:fontRef>
+        </p:style>
+      </p:cxnSp>
+    </p:spTree>
+    <p:extLst>
+      <p:ext uri="{BB962C8B-B14F-4D97-AF65-F5344CB8AC3E}">
+        <p14:creationId xmlns:p14="http://schemas.microsoft.com/office/powerpoint/2010/main" xmlns="" val="3136318115"/>
+      </p:ext>
+    </p:extLst>
+  </p:cSld>
+  <p:clrMapOvr>
+    <a:masterClrMapping/>
+  </p:clrMapOvr>
+</p:sld>
+</file>
+
+<file path=ppt/slides/slide15.xml><?xml version="1.0" encoding="utf-8"?>
+<p:sld xmlns:a="http://schemas.openxmlformats.org/drawingml/2006/main" xmlns:r="http://schemas.openxmlformats.org/officeDocument/2006/relationships" xmlns:p="http://schemas.openxmlformats.org/presentationml/2006/main">
+  <p:cSld>
+    <p:spTree>
+      <p:nvGrpSpPr>
+        <p:cNvPr id="1" name=""/>
+        <p:cNvGrpSpPr/>
+        <p:nvPr/>
+      </p:nvGrpSpPr>
+      <p:grpSpPr>
+        <a:xfrm>
+          <a:off x="0" y="0"/>
+          <a:ext cx="0" cy="0"/>
+          <a:chOff x="0" y="0"/>
+          <a:chExt cx="0" cy="0"/>
+        </a:xfrm>
+      </p:grpSpPr>
+      <p:sp>
+        <p:nvSpPr>
+          <p:cNvPr id="2" name="Title 1"/>
+          <p:cNvSpPr>
+            <a:spLocks noGrp="1"/>
+          </p:cNvSpPr>
+          <p:nvPr>
+            <p:ph type="title"/>
+          </p:nvPr>
+        </p:nvSpPr>
+        <p:spPr/>
+        <p:txBody>
+          <a:bodyPr/>
+          <a:lstStyle/>
+          <a:p>
+            <a:r>
+              <a:rPr lang="en-US" dirty="0" smtClean="0"/>
               <a:t>Lab Questions: Continued</a:t>
             </a:r>
             <a:endParaRPr lang="en-US" dirty="0"/>
@@ -7737,7 +7934,7 @@
     </p:spTree>
     <p:extLst>
       <p:ext uri="{BB962C8B-B14F-4D97-AF65-F5344CB8AC3E}">
-        <p14:creationId xmlns:p14="http://schemas.microsoft.com/office/powerpoint/2010/main" val="589821949"/>
+        <p14:creationId xmlns:p14="http://schemas.microsoft.com/office/powerpoint/2010/main" xmlns="" val="589821949"/>
       </p:ext>
     </p:extLst>
   </p:cSld>
@@ -7781,7 +7978,7 @@
           <a:p>
             <a:r>
               <a:rPr lang="en-US" dirty="0" smtClean="0"/>
-              <a:t>State Machines</a:t>
+              <a:t>Overview</a:t>
             </a:r>
             <a:endParaRPr lang="en-US" dirty="0"/>
           </a:p>
@@ -7804,21 +8001,14 @@
           <a:p>
             <a:r>
               <a:rPr lang="en-US" dirty="0" smtClean="0"/>
-              <a:t>Similar to switch case</a:t>
+              <a:t>State Machines</a:t>
             </a:r>
           </a:p>
           <a:p>
             <a:r>
               <a:rPr lang="en-US" dirty="0" smtClean="0"/>
-              <a:t>Can transition between defined states</a:t>
-            </a:r>
-          </a:p>
-          <a:p>
-            <a:r>
-              <a:rPr lang="en-US" dirty="0" smtClean="0"/>
-              <a:t>Dependant on output</a:t>
-            </a:r>
-            <a:endParaRPr lang="en-US" dirty="0"/>
+              <a:t>Keys</a:t>
+            </a:r>
           </a:p>
         </p:txBody>
       </p:sp>
@@ -7864,7 +8054,7 @@
           <a:p>
             <a:r>
               <a:rPr lang="en-US" dirty="0" smtClean="0"/>
-              <a:t>SM: Functions</a:t>
+              <a:t>State Machines</a:t>
             </a:r>
             <a:endParaRPr lang="en-US" dirty="0"/>
           </a:p>
@@ -7887,13 +8077,64 @@
           <a:p>
             <a:r>
               <a:rPr lang="en-US" dirty="0" smtClean="0"/>
-              <a:t>No global variable</a:t>
+              <a:t>Similar to switch case</a:t>
             </a:r>
           </a:p>
           <a:p>
             <a:r>
               <a:rPr lang="en-US" dirty="0" smtClean="0"/>
-              <a:t>Each state is a separate function</a:t>
+              <a:t>Can transition between defined states</a:t>
+            </a:r>
+          </a:p>
+          <a:p>
+            <a:r>
+              <a:rPr lang="en-US" dirty="0" smtClean="0"/>
+              <a:t>Dependant on </a:t>
+            </a:r>
+            <a:r>
+              <a:rPr lang="en-US" dirty="0" smtClean="0"/>
+              <a:t>output</a:t>
+            </a:r>
+          </a:p>
+          <a:p>
+            <a:r>
+              <a:rPr lang="en-US" dirty="0" smtClean="0"/>
+              <a:t>Five Types:</a:t>
+            </a:r>
+          </a:p>
+          <a:p>
+            <a:pPr lvl="1"/>
+            <a:r>
+              <a:rPr lang="en-US" dirty="0" smtClean="0"/>
+              <a:t>Function</a:t>
+            </a:r>
+          </a:p>
+          <a:p>
+            <a:pPr lvl="1"/>
+            <a:r>
+              <a:rPr lang="en-US" dirty="0" smtClean="0"/>
+              <a:t>If/Else</a:t>
+            </a:r>
+          </a:p>
+          <a:p>
+            <a:pPr lvl="1"/>
+            <a:r>
+              <a:rPr lang="en-US" dirty="0" smtClean="0"/>
+              <a:t>Switch</a:t>
+            </a:r>
+          </a:p>
+          <a:p>
+            <a:pPr lvl="1"/>
+            <a:r>
+              <a:rPr lang="en-US" dirty="0" smtClean="0"/>
+              <a:t>Mealy</a:t>
+            </a:r>
+          </a:p>
+          <a:p>
+            <a:pPr lvl="1"/>
+            <a:r>
+              <a:rPr lang="en-US" dirty="0" smtClean="0"/>
+              <a:t>Hierarchical</a:t>
             </a:r>
           </a:p>
         </p:txBody>
@@ -7940,7 +8181,7 @@
           <a:p>
             <a:r>
               <a:rPr lang="en-US" dirty="0" smtClean="0"/>
-              <a:t>SM: If/Else</a:t>
+              <a:t>SM: Functions</a:t>
             </a:r>
             <a:endParaRPr lang="en-US" dirty="0"/>
           </a:p>
@@ -7963,22 +8204,14 @@
           <a:p>
             <a:r>
               <a:rPr lang="en-US" dirty="0" smtClean="0"/>
-              <a:t>If/else statements</a:t>
-            </a:r>
-          </a:p>
-          <a:p>
-            <a:pPr lvl="1"/>
+              <a:t>No global variable</a:t>
+            </a:r>
+          </a:p>
+          <a:p>
             <a:r>
               <a:rPr lang="en-US" dirty="0" smtClean="0"/>
-              <a:t>Route path to new “state”</a:t>
-            </a:r>
-          </a:p>
-          <a:p>
-            <a:r>
-              <a:rPr lang="en-US" dirty="0" smtClean="0"/>
-              <a:t>Need a “state” variable</a:t>
-            </a:r>
-            <a:endParaRPr lang="en-US" dirty="0"/>
+              <a:t>Each state is a separate function</a:t>
+            </a:r>
           </a:p>
         </p:txBody>
       </p:sp>
@@ -8024,7 +8257,7 @@
           <a:p>
             <a:r>
               <a:rPr lang="en-US" dirty="0" smtClean="0"/>
-              <a:t>SM: Switch</a:t>
+              <a:t>SM: If/Else</a:t>
             </a:r>
             <a:endParaRPr lang="en-US" dirty="0"/>
           </a:p>
@@ -8047,50 +8280,25 @@
           <a:p>
             <a:r>
               <a:rPr lang="en-US" dirty="0" smtClean="0"/>
-              <a:t>Each case is a state</a:t>
-            </a:r>
-          </a:p>
-          <a:p>
+              <a:t>If/else statements</a:t>
+            </a:r>
+          </a:p>
+          <a:p>
+            <a:pPr lvl="1"/>
             <a:r>
               <a:rPr lang="en-US" dirty="0" smtClean="0"/>
-              <a:t>Entire case statement has to be looped</a:t>
+              <a:t>Route path to new “state”</a:t>
             </a:r>
           </a:p>
           <a:p>
             <a:r>
               <a:rPr lang="en-US" dirty="0" smtClean="0"/>
-              <a:t>Allows compiler to find best path</a:t>
+              <a:t>Need a “state” variable</a:t>
             </a:r>
             <a:endParaRPr lang="en-US" dirty="0"/>
           </a:p>
         </p:txBody>
       </p:sp>
-      <p:pic>
-        <p:nvPicPr>
-          <p:cNvPr id="4" name="Picture 2" descr="C:\Users\James\Documents\Intro\MyTeam\Projects\recap\state_img.jpg"/>
-          <p:cNvPicPr>
-            <a:picLocks noChangeAspect="1" noChangeArrowheads="1"/>
-          </p:cNvPicPr>
-          <p:nvPr/>
-        </p:nvPicPr>
-        <p:blipFill>
-          <a:blip r:embed="rId2" cstate="print"/>
-          <a:srcRect/>
-          <a:stretch>
-            <a:fillRect/>
-          </a:stretch>
-        </p:blipFill>
-        <p:spPr bwMode="auto">
-          <a:xfrm>
-            <a:off x="5638800" y="3505200"/>
-            <a:ext cx="2857500" cy="2797342"/>
-          </a:xfrm>
-          <a:prstGeom prst="rect">
-            <a:avLst/>
-          </a:prstGeom>
-          <a:noFill/>
-        </p:spPr>
-      </p:pic>
     </p:spTree>
   </p:cSld>
   <p:clrMapOvr>
@@ -8133,7 +8341,7 @@
           <a:p>
             <a:r>
               <a:rPr lang="en-US" dirty="0" smtClean="0"/>
-              <a:t>SM: Mealy (Definite)</a:t>
+              <a:t>SM: Switch</a:t>
             </a:r>
             <a:endParaRPr lang="en-US" dirty="0"/>
           </a:p>
@@ -8154,10 +8362,52 @@
           <a:bodyPr/>
           <a:lstStyle/>
           <a:p>
+            <a:r>
+              <a:rPr lang="en-US" dirty="0" smtClean="0"/>
+              <a:t>Each case is a state</a:t>
+            </a:r>
+          </a:p>
+          <a:p>
+            <a:r>
+              <a:rPr lang="en-US" dirty="0" smtClean="0"/>
+              <a:t>Entire case statement has to be looped</a:t>
+            </a:r>
+          </a:p>
+          <a:p>
+            <a:r>
+              <a:rPr lang="en-US" dirty="0" smtClean="0"/>
+              <a:t>Allows compiler to find best path</a:t>
+            </a:r>
             <a:endParaRPr lang="en-US" dirty="0"/>
           </a:p>
         </p:txBody>
       </p:sp>
+      <p:pic>
+        <p:nvPicPr>
+          <p:cNvPr id="11266" name="Picture 2" descr="http://community.arm.com/servlet/JiveServlet/showImage/38-1387-2686/blogentry-107443-041572500+1361309524_thumb.png"/>
+          <p:cNvPicPr>
+            <a:picLocks noChangeAspect="1" noChangeArrowheads="1"/>
+          </p:cNvPicPr>
+          <p:nvPr/>
+        </p:nvPicPr>
+        <p:blipFill>
+          <a:blip r:embed="rId2" cstate="print"/>
+          <a:srcRect/>
+          <a:stretch>
+            <a:fillRect/>
+          </a:stretch>
+        </p:blipFill>
+        <p:spPr bwMode="auto">
+          <a:xfrm>
+            <a:off x="3048000" y="3448049"/>
+            <a:ext cx="3552825" cy="3409951"/>
+          </a:xfrm>
+          <a:prstGeom prst="rect">
+            <a:avLst/>
+          </a:prstGeom>
+          <a:noFill/>
+        </p:spPr>
+      </p:pic>
     </p:spTree>
   </p:cSld>
   <p:clrMapOvr>
@@ -8200,7 +8450,15 @@
           <a:p>
             <a:r>
               <a:rPr lang="en-US" dirty="0" smtClean="0"/>
-              <a:t>SM: Hierarchical</a:t>
+              <a:t>SM: Mealy </a:t>
+            </a:r>
+            <a:r>
+              <a:rPr lang="en-US" dirty="0" smtClean="0"/>
+              <a:t>(Finite</a:t>
+            </a:r>
+            <a:r>
+              <a:rPr lang="en-US" dirty="0" smtClean="0"/>
+              <a:t>)</a:t>
             </a:r>
             <a:endParaRPr lang="en-US" dirty="0"/>
           </a:p>
@@ -8223,18 +8481,52 @@
           <a:p>
             <a:r>
               <a:rPr lang="en-US" dirty="0" smtClean="0"/>
-              <a:t>“Nested”</a:t>
-            </a:r>
-          </a:p>
-          <a:p>
+              <a:t>Depend on two factors</a:t>
+            </a:r>
+          </a:p>
+          <a:p>
+            <a:pPr lvl="1"/>
             <a:r>
               <a:rPr lang="en-US" dirty="0" smtClean="0"/>
-              <a:t>State machine within a state machine</a:t>
+              <a:t>Current state of machine</a:t>
+            </a:r>
+          </a:p>
+          <a:p>
+            <a:pPr lvl="1"/>
+            <a:r>
+              <a:rPr lang="en-US" dirty="0" smtClean="0"/>
+              <a:t>Triggering source</a:t>
             </a:r>
             <a:endParaRPr lang="en-US" dirty="0"/>
           </a:p>
         </p:txBody>
       </p:sp>
+      <p:pic>
+        <p:nvPicPr>
+          <p:cNvPr id="10244" name="Picture 4" descr="http://upload.wikimedia.org/wikipedia/commons/b/b4/Mealy.png"/>
+          <p:cNvPicPr>
+            <a:picLocks noChangeAspect="1" noChangeArrowheads="1"/>
+          </p:cNvPicPr>
+          <p:nvPr/>
+        </p:nvPicPr>
+        <p:blipFill>
+          <a:blip r:embed="rId2" cstate="print"/>
+          <a:srcRect/>
+          <a:stretch>
+            <a:fillRect/>
+          </a:stretch>
+        </p:blipFill>
+        <p:spPr bwMode="auto">
+          <a:xfrm>
+            <a:off x="3505200" y="3581400"/>
+            <a:ext cx="2219325" cy="3086045"/>
+          </a:xfrm>
+          <a:prstGeom prst="rect">
+            <a:avLst/>
+          </a:prstGeom>
+          <a:noFill/>
+        </p:spPr>
+      </p:pic>
     </p:spTree>
   </p:cSld>
   <p:clrMapOvr>
@@ -8270,23 +8562,15 @@
             <p:ph type="title"/>
           </p:nvPr>
         </p:nvSpPr>
-        <p:spPr>
-          <a:xfrm>
-            <a:off x="914400" y="512064"/>
-            <a:ext cx="7772400" cy="1088136"/>
-          </a:xfrm>
-        </p:spPr>
+        <p:spPr/>
         <p:txBody>
           <a:bodyPr/>
           <a:lstStyle/>
           <a:p>
             <a:r>
               <a:rPr lang="en-US" dirty="0" smtClean="0"/>
-              <a:t>Keys</a:t>
-            </a:r>
-            <a:br>
-              <a:rPr lang="en-US" dirty="0" smtClean="0"/>
-            </a:br>
+              <a:t>SM: Hierarchical</a:t>
+            </a:r>
             <a:endParaRPr lang="en-US" dirty="0"/>
           </a:p>
         </p:txBody>
@@ -8301,121 +8585,51 @@
             <p:ph idx="1"/>
           </p:nvPr>
         </p:nvSpPr>
-        <p:spPr>
-          <a:xfrm>
-            <a:off x="914400" y="1600200"/>
-            <a:ext cx="7772400" cy="4755360"/>
-          </a:xfrm>
-        </p:spPr>
+        <p:spPr/>
         <p:txBody>
           <a:bodyPr/>
           <a:lstStyle/>
           <a:p>
             <a:r>
               <a:rPr lang="en-US" dirty="0" smtClean="0"/>
-              <a:t>Using switches to trigger an event in the software</a:t>
-            </a:r>
-          </a:p>
-          <a:p>
+              <a:t>“Nested”</a:t>
+            </a:r>
+          </a:p>
+          <a:p>
+            <a:r>
+              <a:rPr lang="en-US" dirty="0" smtClean="0"/>
+              <a:t>State machine within a state machine</a:t>
+            </a:r>
             <a:endParaRPr lang="en-US" dirty="0"/>
           </a:p>
-          <a:p>
-            <a:r>
-              <a:rPr lang="en-US" dirty="0" smtClean="0"/>
-              <a:t>Must consider:</a:t>
-            </a:r>
-          </a:p>
-          <a:p>
-            <a:pPr lvl="1">
-              <a:buClr>
-                <a:schemeClr val="tx1"/>
-              </a:buClr>
-              <a:buFont typeface="Wingdings" panose="05000000000000000000" pitchFamily="2" charset="2"/>
-              <a:buChar char=""/>
-            </a:pPr>
-            <a:r>
-              <a:rPr lang="en-US" dirty="0" smtClean="0"/>
-              <a:t>Pull Up/ Pull Down Resistors</a:t>
-            </a:r>
-          </a:p>
-          <a:p>
-            <a:pPr lvl="4">
-              <a:buClr>
-                <a:schemeClr val="tx1"/>
-              </a:buClr>
-              <a:buFont typeface="Wingdings" panose="05000000000000000000" pitchFamily="2" charset="2"/>
-              <a:buChar char=""/>
-            </a:pPr>
-            <a:r>
-              <a:rPr lang="en-US" dirty="0" smtClean="0"/>
-              <a:t>External Resistors</a:t>
-            </a:r>
-          </a:p>
-          <a:p>
-            <a:pPr lvl="4">
-              <a:buClr>
-                <a:schemeClr val="tx1"/>
-              </a:buClr>
-              <a:buFont typeface="Wingdings" panose="05000000000000000000" pitchFamily="2" charset="2"/>
-              <a:buChar char=""/>
-            </a:pPr>
-            <a:r>
-              <a:rPr lang="en-US" dirty="0" smtClean="0"/>
-              <a:t>Internal Resistors</a:t>
-            </a:r>
-          </a:p>
-          <a:p>
-            <a:pPr lvl="1">
-              <a:buClr>
-                <a:schemeClr val="tx1"/>
-              </a:buClr>
-              <a:buFont typeface="Wingdings" panose="05000000000000000000" pitchFamily="2" charset="2"/>
-              <a:buChar char=""/>
-            </a:pPr>
-            <a:r>
-              <a:rPr lang="en-US" dirty="0" smtClean="0"/>
-              <a:t>Proper Synchronization</a:t>
-            </a:r>
-          </a:p>
-          <a:p>
-            <a:pPr lvl="4">
-              <a:buClr>
-                <a:schemeClr val="tx1"/>
-              </a:buClr>
-              <a:buFont typeface="Wingdings" panose="05000000000000000000" pitchFamily="2" charset="2"/>
-              <a:buChar char=""/>
-            </a:pPr>
-            <a:r>
-              <a:rPr lang="en-US" sz="2300" dirty="0" smtClean="0"/>
-              <a:t>Real time/Gadfly Synchronization</a:t>
-            </a:r>
-          </a:p>
-          <a:p>
-            <a:pPr lvl="4">
-              <a:buClr>
-                <a:schemeClr val="tx1"/>
-              </a:buClr>
-              <a:buFont typeface="Wingdings" panose="05000000000000000000" pitchFamily="2" charset="2"/>
-              <a:buChar char=""/>
-            </a:pPr>
-            <a:r>
-              <a:rPr lang="en-US" sz="2300" dirty="0" smtClean="0"/>
-              <a:t>Interrupt Synchronization</a:t>
-            </a:r>
-          </a:p>
-          <a:p>
-            <a:pPr lvl="1">
-              <a:buClr>
-                <a:schemeClr val="tx1"/>
-              </a:buClr>
-            </a:pPr>
-            <a:endParaRPr lang="en-US" dirty="0" smtClean="0"/>
-          </a:p>
-          <a:p>
-            <a:endParaRPr lang="en-US" dirty="0"/>
-          </a:p>
-        </p:txBody>
-      </p:sp>
+        </p:txBody>
+      </p:sp>
+      <p:pic>
+        <p:nvPicPr>
+          <p:cNvPr id="9220" name="Picture 4" descr="http://www.dossier-andreas.net/software_architecture/fsm_2.jpg"/>
+          <p:cNvPicPr>
+            <a:picLocks noChangeAspect="1" noChangeArrowheads="1"/>
+          </p:cNvPicPr>
+          <p:nvPr/>
+        </p:nvPicPr>
+        <p:blipFill>
+          <a:blip r:embed="rId2" cstate="print"/>
+          <a:srcRect/>
+          <a:stretch>
+            <a:fillRect/>
+          </a:stretch>
+        </p:blipFill>
+        <p:spPr bwMode="auto">
+          <a:xfrm>
+            <a:off x="1752600" y="3352800"/>
+            <a:ext cx="5524500" cy="3257550"/>
+          </a:xfrm>
+          <a:prstGeom prst="rect">
+            <a:avLst/>
+          </a:prstGeom>
+          <a:noFill/>
+        </p:spPr>
+      </p:pic>
     </p:spTree>
   </p:cSld>
   <p:clrMapOvr>
@@ -8451,15 +8665,23 @@
             <p:ph type="title"/>
           </p:nvPr>
         </p:nvSpPr>
-        <p:spPr/>
+        <p:spPr>
+          <a:xfrm>
+            <a:off x="914400" y="512064"/>
+            <a:ext cx="7772400" cy="1088136"/>
+          </a:xfrm>
+        </p:spPr>
         <p:txBody>
           <a:bodyPr/>
           <a:lstStyle/>
           <a:p>
             <a:r>
               <a:rPr lang="en-US" dirty="0" smtClean="0"/>
-              <a:t>Keys: Pull Up/Down Resistors</a:t>
-            </a:r>
+              <a:t>Keys</a:t>
+            </a:r>
+            <a:br>
+              <a:rPr lang="en-US" dirty="0" smtClean="0"/>
+            </a:br>
             <a:endParaRPr lang="en-US" dirty="0"/>
           </a:p>
         </p:txBody>
@@ -8476,8 +8698,8 @@
         </p:nvSpPr>
         <p:spPr>
           <a:xfrm>
-            <a:off x="419100" y="1676400"/>
-            <a:ext cx="5921960" cy="4581624"/>
+            <a:off x="914400" y="1600200"/>
+            <a:ext cx="7772400" cy="4755360"/>
           </a:xfrm>
         </p:spPr>
         <p:txBody>
@@ -8486,106 +8708,110 @@
           <a:p>
             <a:r>
               <a:rPr lang="en-US" dirty="0" smtClean="0"/>
-              <a:t>No pull up/down = floating values</a:t>
-            </a:r>
+              <a:t>Using switches to trigger an event in the software</a:t>
+            </a:r>
+          </a:p>
+          <a:p>
+            <a:endParaRPr lang="en-US" dirty="0"/>
           </a:p>
           <a:p>
             <a:r>
               <a:rPr lang="en-US" dirty="0" smtClean="0"/>
-              <a:t>Floating values cause false triggers in the switch</a:t>
-            </a:r>
-          </a:p>
-          <a:p>
+              <a:t>Must consider:</a:t>
+            </a:r>
+          </a:p>
+          <a:p>
+            <a:pPr lvl="1">
+              <a:buClr>
+                <a:schemeClr val="tx1"/>
+              </a:buClr>
+              <a:buFont typeface="Wingdings" panose="05000000000000000000" pitchFamily="2" charset="2"/>
+              <a:buChar char=""/>
+            </a:pPr>
+            <a:r>
+              <a:rPr lang="en-US" dirty="0" smtClean="0"/>
+              <a:t>Pull Up/ Pull Down Resistors</a:t>
+            </a:r>
+          </a:p>
+          <a:p>
+            <a:pPr lvl="4">
+              <a:buClr>
+                <a:schemeClr val="tx1"/>
+              </a:buClr>
+              <a:buFont typeface="Wingdings" panose="05000000000000000000" pitchFamily="2" charset="2"/>
+              <a:buChar char=""/>
+            </a:pPr>
+            <a:r>
+              <a:rPr lang="en-US" dirty="0" smtClean="0"/>
+              <a:t>External Resistors</a:t>
+            </a:r>
+          </a:p>
+          <a:p>
+            <a:pPr lvl="4">
+              <a:buClr>
+                <a:schemeClr val="tx1"/>
+              </a:buClr>
+              <a:buFont typeface="Wingdings" panose="05000000000000000000" pitchFamily="2" charset="2"/>
+              <a:buChar char=""/>
+            </a:pPr>
+            <a:r>
+              <a:rPr lang="en-US" dirty="0" smtClean="0"/>
+              <a:t>Internal Resistors</a:t>
+            </a:r>
+          </a:p>
+          <a:p>
+            <a:pPr lvl="1">
+              <a:buClr>
+                <a:schemeClr val="tx1"/>
+              </a:buClr>
+              <a:buFont typeface="Wingdings" panose="05000000000000000000" pitchFamily="2" charset="2"/>
+              <a:buChar char=""/>
+            </a:pPr>
+            <a:r>
+              <a:rPr lang="en-US" dirty="0" smtClean="0"/>
+              <a:t>Proper Synchronization</a:t>
+            </a:r>
+          </a:p>
+          <a:p>
+            <a:pPr lvl="4">
+              <a:buClr>
+                <a:schemeClr val="tx1"/>
+              </a:buClr>
+              <a:buFont typeface="Wingdings" panose="05000000000000000000" pitchFamily="2" charset="2"/>
+              <a:buChar char=""/>
+            </a:pPr>
+            <a:r>
+              <a:rPr lang="en-US" sz="2300" dirty="0" smtClean="0"/>
+              <a:t>Real time/Gadfly Synchronization</a:t>
+            </a:r>
+          </a:p>
+          <a:p>
+            <a:pPr lvl="4">
+              <a:buClr>
+                <a:schemeClr val="tx1"/>
+              </a:buClr>
+              <a:buFont typeface="Wingdings" panose="05000000000000000000" pitchFamily="2" charset="2"/>
+              <a:buChar char=""/>
+            </a:pPr>
+            <a:r>
+              <a:rPr lang="en-US" sz="2300" dirty="0" smtClean="0"/>
+              <a:t>Interrupt Synchronization</a:t>
+            </a:r>
+          </a:p>
+          <a:p>
+            <a:pPr lvl="1">
+              <a:buClr>
+                <a:schemeClr val="tx1"/>
+              </a:buClr>
+            </a:pPr>
             <a:endParaRPr lang="en-US" dirty="0" smtClean="0"/>
           </a:p>
           <a:p>
             <a:endParaRPr lang="en-US" dirty="0"/>
           </a:p>
-          <a:p>
-            <a:r>
-              <a:rPr lang="en-US" dirty="0" smtClean="0"/>
-              <a:t>By adding a resistor to ground or VCC we can always keep a defined state of HIGH or LOW, preventing false triggers</a:t>
-            </a:r>
-          </a:p>
-          <a:p>
-            <a:endParaRPr lang="en-US" dirty="0"/>
-          </a:p>
-          <a:p>
-            <a:endParaRPr lang="en-US" dirty="0"/>
-          </a:p>
-        </p:txBody>
-      </p:sp>
-      <p:pic>
-        <p:nvPicPr>
-          <p:cNvPr id="1028" name="Picture 4" descr="http://images.elektroda.net/37_1290066934.png"/>
-          <p:cNvPicPr>
-            <a:picLocks noChangeAspect="1" noChangeArrowheads="1"/>
-          </p:cNvPicPr>
-          <p:nvPr/>
-        </p:nvPicPr>
-        <p:blipFill>
-          <a:blip r:embed="rId3">
-            <a:extLst>
-              <a:ext uri="{28A0092B-C50C-407E-A947-70E740481C1C}">
-                <a14:useLocalDpi xmlns:a14="http://schemas.microsoft.com/office/drawing/2010/main" val="0"/>
-              </a:ext>
-            </a:extLst>
-          </a:blip>
-          <a:srcRect/>
-          <a:stretch>
-            <a:fillRect/>
-          </a:stretch>
-        </p:blipFill>
-        <p:spPr bwMode="auto">
-          <a:xfrm>
-            <a:off x="6341060" y="3505200"/>
-            <a:ext cx="2672179" cy="3231360"/>
-          </a:xfrm>
-          <a:prstGeom prst="rect">
-            <a:avLst/>
-          </a:prstGeom>
-          <a:noFill/>
-          <a:extLst>
-            <a:ext uri="{909E8E84-426E-40DD-AFC4-6F175D3DCCD1}">
-              <a14:hiddenFill xmlns:a14="http://schemas.microsoft.com/office/drawing/2010/main">
-                <a:solidFill>
-                  <a:srgbClr val="FFFFFF"/>
-                </a:solidFill>
-              </a14:hiddenFill>
-            </a:ext>
-          </a:extLst>
-        </p:spPr>
-      </p:pic>
-      <p:pic>
-        <p:nvPicPr>
-          <p:cNvPr id="4" name="Picture 3"/>
-          <p:cNvPicPr>
-            <a:picLocks noChangeAspect="1"/>
-          </p:cNvPicPr>
-          <p:nvPr/>
-        </p:nvPicPr>
-        <p:blipFill>
-          <a:blip r:embed="rId4"/>
-          <a:stretch>
-            <a:fillRect/>
-          </a:stretch>
-        </p:blipFill>
-        <p:spPr>
-          <a:xfrm>
-            <a:off x="6384339" y="1219200"/>
-            <a:ext cx="2628900" cy="2168843"/>
-          </a:xfrm>
-          <a:prstGeom prst="rect">
-            <a:avLst/>
-          </a:prstGeom>
-        </p:spPr>
-      </p:pic>
+        </p:txBody>
+      </p:sp>
     </p:spTree>
-    <p:extLst>
-      <p:ext uri="{BB962C8B-B14F-4D97-AF65-F5344CB8AC3E}">
-        <p14:creationId xmlns:p14="http://schemas.microsoft.com/office/powerpoint/2010/main" val="1652423782"/>
-      </p:ext>
-    </p:extLst>
   </p:cSld>
   <p:clrMapOvr>
     <a:masterClrMapping/>
@@ -8963,7 +9189,7 @@
     </a:clrScheme>
     <a:fontScheme name="Office">
       <a:majorFont>
-        <a:latin typeface="Calibri Light" panose="020F0302020204030204"/>
+        <a:latin typeface="Calibri Light"/>
         <a:ea typeface=""/>
         <a:cs typeface=""/>
         <a:font script="Jpan" typeface="ＭＳ Ｐゴシック"/>
@@ -8998,7 +9224,7 @@
         <a:font script="Geor" typeface="Sylfaen"/>
       </a:majorFont>
       <a:minorFont>
-        <a:latin typeface="Calibri" panose="020F0502020204030204"/>
+        <a:latin typeface="Calibri"/>
         <a:ea typeface=""/>
         <a:cs typeface=""/>
         <a:font script="Jpan" typeface="ＭＳ Ｐゴシック"/>
@@ -9175,7 +9401,7 @@
   <a:extraClrSchemeLst/>
   <a:extLst>
     <a:ext uri="{05A4C25C-085E-4340-85A3-A5531E510DB2}">
-      <thm15:themeFamily xmlns:thm15="http://schemas.microsoft.com/office/thememl/2012/main" name="Office Theme" id="{62F939B6-93AF-4DB8-9C6B-D6C7DFDC589F}" vid="{4A3C46E8-61CC-4603-A589-7422A47A8E4A}"/>
+      <thm15:themeFamily xmlns:thm15="http://schemas.microsoft.com/office/thememl/2012/main" xmlns="" name="Office Theme" id="{62F939B6-93AF-4DB8-9C6B-D6C7DFDC589F}" vid="{4A3C46E8-61CC-4603-A589-7422A47A8E4A}"/>
     </a:ext>
   </a:extLst>
 </a:theme>

</xml_diff>

<commit_message>
Corrected wrong lab answer in powerpoint
</commit_message>
<xml_diff>
--- a/Projects/recap/week5a_recap.pptx
+++ b/Projects/recap/week5a_recap.pptx
@@ -235,7 +235,7 @@
             <a:fld id="{8E9F2F70-7F24-48F2-BAC3-4187E7DFC08C}" type="datetimeFigureOut">
               <a:rPr lang="en-US" smtClean="0"/>
               <a:pPr/>
-              <a:t>3/22/2015</a:t>
+              <a:t>3/23/2015</a:t>
             </a:fld>
             <a:endParaRPr lang="en-US"/>
           </a:p>
@@ -626,7 +626,7 @@
             <a:fld id="{93612900-739A-42EB-8572-C4EB7D3F20C3}" type="datetimeFigureOut">
               <a:rPr lang="en-US" smtClean="0"/>
               <a:pPr/>
-              <a:t>3/22/2015</a:t>
+              <a:t>3/23/2015</a:t>
             </a:fld>
             <a:endParaRPr lang="en-US"/>
           </a:p>
@@ -1345,7 +1345,7 @@
             <a:fld id="{93612900-739A-42EB-8572-C4EB7D3F20C3}" type="datetimeFigureOut">
               <a:rPr lang="en-US" smtClean="0"/>
               <a:pPr/>
-              <a:t>3/22/2015</a:t>
+              <a:t>3/23/2015</a:t>
             </a:fld>
             <a:endParaRPr lang="en-US"/>
           </a:p>
@@ -1532,7 +1532,7 @@
             <a:fld id="{93612900-739A-42EB-8572-C4EB7D3F20C3}" type="datetimeFigureOut">
               <a:rPr lang="en-US" smtClean="0"/>
               <a:pPr/>
-              <a:t>3/22/2015</a:t>
+              <a:t>3/23/2015</a:t>
             </a:fld>
             <a:endParaRPr lang="en-US"/>
           </a:p>
@@ -1709,7 +1709,7 @@
             <a:fld id="{93612900-739A-42EB-8572-C4EB7D3F20C3}" type="datetimeFigureOut">
               <a:rPr lang="en-US" smtClean="0"/>
               <a:pPr/>
-              <a:t>3/22/2015</a:t>
+              <a:t>3/23/2015</a:t>
             </a:fld>
             <a:endParaRPr lang="en-US"/>
           </a:p>
@@ -3194,7 +3194,7 @@
             <a:fld id="{93612900-739A-42EB-8572-C4EB7D3F20C3}" type="datetimeFigureOut">
               <a:rPr lang="en-US" smtClean="0"/>
               <a:pPr/>
-              <a:t>3/22/2015</a:t>
+              <a:t>3/23/2015</a:t>
             </a:fld>
             <a:endParaRPr lang="en-US"/>
           </a:p>
@@ -3796,7 +3796,7 @@
             <a:fld id="{93612900-739A-42EB-8572-C4EB7D3F20C3}" type="datetimeFigureOut">
               <a:rPr lang="en-US" smtClean="0"/>
               <a:pPr/>
-              <a:t>3/22/2015</a:t>
+              <a:t>3/23/2015</a:t>
             </a:fld>
             <a:endParaRPr lang="en-US"/>
           </a:p>
@@ -4235,7 +4235,7 @@
             <a:fld id="{93612900-739A-42EB-8572-C4EB7D3F20C3}" type="datetimeFigureOut">
               <a:rPr lang="en-US" smtClean="0"/>
               <a:pPr/>
-              <a:t>3/22/2015</a:t>
+              <a:t>3/23/2015</a:t>
             </a:fld>
             <a:endParaRPr lang="en-US"/>
           </a:p>
@@ -4798,7 +4798,7 @@
             <a:fld id="{93612900-739A-42EB-8572-C4EB7D3F20C3}" type="datetimeFigureOut">
               <a:rPr lang="en-US" smtClean="0"/>
               <a:pPr/>
-              <a:t>3/22/2015</a:t>
+              <a:t>3/23/2015</a:t>
             </a:fld>
             <a:endParaRPr lang="en-US"/>
           </a:p>
@@ -4896,7 +4896,7 @@
             <a:fld id="{93612900-739A-42EB-8572-C4EB7D3F20C3}" type="datetimeFigureOut">
               <a:rPr lang="en-US" smtClean="0"/>
               <a:pPr/>
-              <a:t>3/22/2015</a:t>
+              <a:t>3/23/2015</a:t>
             </a:fld>
             <a:endParaRPr lang="en-US"/>
           </a:p>
@@ -5152,7 +5152,7 @@
             <a:fld id="{93612900-739A-42EB-8572-C4EB7D3F20C3}" type="datetimeFigureOut">
               <a:rPr lang="en-US" smtClean="0"/>
               <a:pPr/>
-              <a:t>3/22/2015</a:t>
+              <a:t>3/23/2015</a:t>
             </a:fld>
             <a:endParaRPr lang="en-US"/>
           </a:p>
@@ -5875,7 +5875,7 @@
             <a:fld id="{93612900-739A-42EB-8572-C4EB7D3F20C3}" type="datetimeFigureOut">
               <a:rPr lang="en-US" smtClean="0"/>
               <a:pPr/>
-              <a:t>3/22/2015</a:t>
+              <a:t>3/23/2015</a:t>
             </a:fld>
             <a:endParaRPr lang="en-US"/>
           </a:p>
@@ -6550,7 +6550,7 @@
             <a:fld id="{93612900-739A-42EB-8572-C4EB7D3F20C3}" type="datetimeFigureOut">
               <a:rPr lang="en-US" smtClean="0"/>
               <a:pPr/>
-              <a:t>3/22/2015</a:t>
+              <a:t>3/23/2015</a:t>
             </a:fld>
             <a:endParaRPr lang="en-US"/>
           </a:p>
@@ -7158,7 +7158,7 @@
           <p:nvPr/>
         </p:nvPicPr>
         <p:blipFill>
-          <a:blip r:embed="rId4" cstate="print"/>
+          <a:blip r:embed="rId3" cstate="print"/>
           <a:stretch>
             <a:fillRect/>
           </a:stretch>
@@ -7320,11 +7320,7 @@
           <a:p>
             <a:r>
               <a:rPr lang="en-US" sz="3600" dirty="0" smtClean="0"/>
-              <a:t>Gadfly </a:t>
-            </a:r>
-            <a:r>
-              <a:rPr lang="en-US" sz="3600" dirty="0" smtClean="0"/>
-              <a:t>Synchronization</a:t>
+              <a:t>Gadfly Synchronization</a:t>
             </a:r>
             <a:endParaRPr lang="en-US" sz="3600" dirty="0"/>
           </a:p>
@@ -7615,7 +7611,7 @@
         </p:spPr>
         <p:txBody>
           <a:bodyPr>
-            <a:normAutofit fontScale="92500" lnSpcReduction="10000"/>
+            <a:normAutofit/>
           </a:bodyPr>
           <a:lstStyle/>
           <a:p>
@@ -7669,7 +7665,7 @@
                   </a:schemeClr>
                 </a:solidFill>
               </a:rPr>
-              <a:t>A</a:t>
+              <a:t>A: </a:t>
             </a:r>
             <a:r>
               <a:rPr lang="en-US" sz="2800" dirty="0" smtClean="0">
@@ -7680,21 +7676,85 @@
                   </a:schemeClr>
                 </a:solidFill>
               </a:rPr>
-              <a:t>: Yes, looking at the schematic no external resistor is attached so an internal pull-up is required to avoid floating values.</a:t>
-            </a:r>
-            <a:endParaRPr lang="en-US" sz="2800" dirty="0" smtClean="0">
-              <a:solidFill>
-                <a:schemeClr val="accent1">
-                  <a:lumMod val="40000"/>
-                  <a:lumOff val="60000"/>
-                </a:schemeClr>
-              </a:solidFill>
-            </a:endParaRPr>
-          </a:p>
-          <a:p>
-            <a:pPr marL="68580" indent="0">
-              <a:buNone/>
-            </a:pPr>
+              <a:t>No, </a:t>
+            </a:r>
+            <a:r>
+              <a:rPr lang="en-US" sz="2800" dirty="0" smtClean="0">
+                <a:solidFill>
+                  <a:schemeClr val="accent1">
+                    <a:lumMod val="40000"/>
+                    <a:lumOff val="60000"/>
+                  </a:schemeClr>
+                </a:solidFill>
+              </a:rPr>
+              <a:t>looking at the </a:t>
+            </a:r>
+            <a:r>
+              <a:rPr lang="en-US" sz="2800" dirty="0" smtClean="0">
+                <a:solidFill>
+                  <a:schemeClr val="accent1">
+                    <a:lumMod val="40000"/>
+                    <a:lumOff val="60000"/>
+                  </a:schemeClr>
+                </a:solidFill>
+              </a:rPr>
+              <a:t>schematic </a:t>
+            </a:r>
+            <a:r>
+              <a:rPr lang="en-US" sz="2800" dirty="0" smtClean="0">
+                <a:solidFill>
+                  <a:schemeClr val="accent1">
+                    <a:lumMod val="40000"/>
+                    <a:lumOff val="60000"/>
+                  </a:schemeClr>
+                </a:solidFill>
+              </a:rPr>
+              <a:t>external resistor </a:t>
+            </a:r>
+            <a:r>
+              <a:rPr lang="en-US" sz="2800" dirty="0" smtClean="0">
+                <a:solidFill>
+                  <a:schemeClr val="accent1">
+                    <a:lumMod val="40000"/>
+                    <a:lumOff val="60000"/>
+                  </a:schemeClr>
+                </a:solidFill>
+              </a:rPr>
+              <a:t>are</a:t>
+            </a:r>
+            <a:r>
+              <a:rPr lang="en-US" sz="2800" dirty="0" smtClean="0">
+                <a:solidFill>
+                  <a:schemeClr val="accent1">
+                    <a:lumMod val="40000"/>
+                    <a:lumOff val="60000"/>
+                  </a:schemeClr>
+                </a:solidFill>
+              </a:rPr>
+              <a:t> </a:t>
+            </a:r>
+            <a:r>
+              <a:rPr lang="en-US" sz="2800" dirty="0" smtClean="0">
+                <a:solidFill>
+                  <a:schemeClr val="accent1">
+                    <a:lumMod val="40000"/>
+                    <a:lumOff val="60000"/>
+                  </a:schemeClr>
+                </a:solidFill>
+              </a:rPr>
+              <a:t>attached so an internal pull-up is </a:t>
+            </a:r>
+            <a:r>
+              <a:rPr lang="en-US" sz="2800" smtClean="0">
+                <a:solidFill>
+                  <a:schemeClr val="accent1">
+                    <a:lumMod val="40000"/>
+                    <a:lumOff val="60000"/>
+                  </a:schemeClr>
+                </a:solidFill>
+              </a:rPr>
+              <a:t>not require.</a:t>
+            </a:r>
             <a:endParaRPr lang="en-US" sz="2800" dirty="0"/>
           </a:p>
           <a:p>
@@ -8201,18 +8261,7 @@
                   </a:schemeClr>
                 </a:solidFill>
               </a:rPr>
-              <a:t>     </a:t>
-            </a:r>
-            <a:r>
-              <a:rPr lang="en-US" sz="2400" dirty="0" smtClean="0">
-                <a:solidFill>
-                  <a:schemeClr val="accent1">
-                    <a:lumMod val="40000"/>
-                    <a:lumOff val="60000"/>
-                  </a:schemeClr>
-                </a:solidFill>
-              </a:rPr>
-              <a:t>Advantage: A built in button allows more features to be added</a:t>
+              <a:t>     Advantage: A built in button allows more features to be added</a:t>
             </a:r>
           </a:p>
           <a:p>
@@ -8230,14 +8279,6 @@
               </a:rPr>
               <a:t>      Disadvantage: Must disconnect and reconnect power to restart</a:t>
             </a:r>
-            <a:endParaRPr lang="en-US" sz="2400" dirty="0" smtClean="0">
-              <a:solidFill>
-                <a:schemeClr val="accent1">
-                  <a:lumMod val="40000"/>
-                  <a:lumOff val="60000"/>
-                </a:schemeClr>
-              </a:solidFill>
-            </a:endParaRPr>
           </a:p>
           <a:p>
             <a:endParaRPr lang="en-US" sz="2400" dirty="0"/>

</xml_diff>